<commit_message>
Work on refactoring the reverse stroop task
</commit_message>
<xml_diff>
--- a/stroopReverse/StroopReverseInstructions.pptx
+++ b/stroopReverse/StroopReverseInstructions.pptx
@@ -5,17 +5,13 @@
     <p:sldMasterId id="2147483648" r:id="rId1"/>
   </p:sldMasterIdLst>
   <p:notesMasterIdLst>
-    <p:notesMasterId r:id="rId10"/>
+    <p:notesMasterId r:id="rId6"/>
   </p:notesMasterIdLst>
   <p:sldIdLst>
-    <p:sldId id="282" r:id="rId2"/>
-    <p:sldId id="283" r:id="rId3"/>
-    <p:sldId id="285" r:id="rId4"/>
-    <p:sldId id="287" r:id="rId5"/>
-    <p:sldId id="277" r:id="rId6"/>
-    <p:sldId id="281" r:id="rId7"/>
-    <p:sldId id="284" r:id="rId8"/>
-    <p:sldId id="286" r:id="rId9"/>
+    <p:sldId id="285" r:id="rId2"/>
+    <p:sldId id="287" r:id="rId3"/>
+    <p:sldId id="284" r:id="rId4"/>
+    <p:sldId id="286" r:id="rId5"/>
   </p:sldIdLst>
   <p:sldSz cx="12192000" cy="6858000"/>
   <p:notesSz cx="6858000" cy="9144000"/>
@@ -204,7 +200,7 @@
           <a:p>
             <a:fld id="{9C9C5307-3CE3-407E-9D60-908EEB969D0F}" type="datetimeFigureOut">
               <a:rPr lang="en-DK" smtClean="0"/>
-              <a:t>30/09/2024</a:t>
+              <a:t>08/11/2024</a:t>
             </a:fld>
             <a:endParaRPr lang="en-DK"/>
           </a:p>
@@ -516,11 +512,21 @@
           <a:bodyPr/>
           <a:lstStyle/>
           <a:p>
+            <a:pPr>
+              <a:lnSpc>
+                <a:spcPts val="1425"/>
+              </a:lnSpc>
+            </a:pPr>
             <a:r>
-              <a:rPr lang="en-GB" dirty="0"/>
-              <a:t>Neutral Stroop Instruction</a:t>
+              <a:rPr lang="en-GB" b="0" dirty="0">
+                <a:solidFill>
+                  <a:srgbClr val="D4D4D4"/>
+                </a:solidFill>
+                <a:effectLst/>
+                <a:latin typeface="Fira Code" pitchFamily="1" charset="0"/>
+              </a:rPr>
+              <a:t>NeutralReverseStroopJoystick.png</a:t>
             </a:r>
-            <a:endParaRPr lang="en-DK" dirty="0"/>
           </a:p>
         </p:txBody>
       </p:sp>
@@ -550,7 +556,7 @@
     </p:spTree>
     <p:extLst>
       <p:ext uri="{BB962C8B-B14F-4D97-AF65-F5344CB8AC3E}">
-        <p14:creationId xmlns:p14="http://schemas.microsoft.com/office/powerpoint/2010/main" val="2608212985"/>
+        <p14:creationId xmlns:p14="http://schemas.microsoft.com/office/powerpoint/2010/main" val="439694720"/>
       </p:ext>
     </p:extLst>
   </p:cSld>
@@ -604,11 +610,21 @@
           <a:bodyPr/>
           <a:lstStyle/>
           <a:p>
+            <a:pPr>
+              <a:lnSpc>
+                <a:spcPts val="1425"/>
+              </a:lnSpc>
+            </a:pPr>
             <a:r>
-              <a:rPr lang="en-GB" dirty="0"/>
-              <a:t>Neutral Stroop Instruction</a:t>
+              <a:rPr lang="en-GB" b="0" dirty="0">
+                <a:solidFill>
+                  <a:srgbClr val="D4D4D4"/>
+                </a:solidFill>
+                <a:effectLst/>
+                <a:latin typeface="Fira Code" pitchFamily="1" charset="0"/>
+              </a:rPr>
+              <a:t>ReverseStroopJoystick.png</a:t>
             </a:r>
-            <a:endParaRPr lang="en-DK" dirty="0"/>
           </a:p>
         </p:txBody>
       </p:sp>
@@ -638,7 +654,7 @@
     </p:spTree>
     <p:extLst>
       <p:ext uri="{BB962C8B-B14F-4D97-AF65-F5344CB8AC3E}">
-        <p14:creationId xmlns:p14="http://schemas.microsoft.com/office/powerpoint/2010/main" val="1595044388"/>
+        <p14:creationId xmlns:p14="http://schemas.microsoft.com/office/powerpoint/2010/main" val="1651138551"/>
       </p:ext>
     </p:extLst>
   </p:cSld>
@@ -692,11 +708,21 @@
           <a:bodyPr/>
           <a:lstStyle/>
           <a:p>
+            <a:pPr>
+              <a:lnSpc>
+                <a:spcPts val="1425"/>
+              </a:lnSpc>
+            </a:pPr>
             <a:r>
-              <a:rPr lang="en-GB" dirty="0"/>
-              <a:t>Neutral Stroop Instruction</a:t>
+              <a:rPr lang="en-GB" b="0" dirty="0">
+                <a:solidFill>
+                  <a:srgbClr val="D4D4D4"/>
+                </a:solidFill>
+                <a:effectLst/>
+                <a:latin typeface="Fira Code" pitchFamily="1" charset="0"/>
+              </a:rPr>
+              <a:t>NeutralReverseStroopPAD.png</a:t>
             </a:r>
-            <a:endParaRPr lang="en-DK" dirty="0"/>
           </a:p>
         </p:txBody>
       </p:sp>
@@ -726,7 +752,7 @@
     </p:spTree>
     <p:extLst>
       <p:ext uri="{BB962C8B-B14F-4D97-AF65-F5344CB8AC3E}">
-        <p14:creationId xmlns:p14="http://schemas.microsoft.com/office/powerpoint/2010/main" val="439694720"/>
+        <p14:creationId xmlns:p14="http://schemas.microsoft.com/office/powerpoint/2010/main" val="2793537641"/>
       </p:ext>
     </p:extLst>
   </p:cSld>
@@ -780,11 +806,21 @@
           <a:bodyPr/>
           <a:lstStyle/>
           <a:p>
+            <a:pPr>
+              <a:lnSpc>
+                <a:spcPts val="1425"/>
+              </a:lnSpc>
+            </a:pPr>
             <a:r>
-              <a:rPr lang="en-GB" dirty="0"/>
-              <a:t>Neutral Stroop Instruction</a:t>
+              <a:rPr lang="en-GB" b="0">
+                <a:solidFill>
+                  <a:srgbClr val="D4D4D4"/>
+                </a:solidFill>
+                <a:effectLst/>
+                <a:latin typeface="Fira Code" pitchFamily="1" charset="0"/>
+              </a:rPr>
+              <a:t>ReverseStroopPAD.png</a:t>
             </a:r>
-            <a:endParaRPr lang="en-DK" dirty="0"/>
           </a:p>
         </p:txBody>
       </p:sp>
@@ -806,358 +842,6 @@
             <a:fld id="{B9B591FB-4521-4877-90E0-876AFC35B8BF}" type="slidenum">
               <a:rPr lang="en-DK" smtClean="0"/>
               <a:t>4</a:t>
-            </a:fld>
-            <a:endParaRPr lang="en-DK"/>
-          </a:p>
-        </p:txBody>
-      </p:sp>
-    </p:spTree>
-    <p:extLst>
-      <p:ext uri="{BB962C8B-B14F-4D97-AF65-F5344CB8AC3E}">
-        <p14:creationId xmlns:p14="http://schemas.microsoft.com/office/powerpoint/2010/main" val="1651138551"/>
-      </p:ext>
-    </p:extLst>
-  </p:cSld>
-  <p:clrMapOvr>
-    <a:masterClrMapping/>
-  </p:clrMapOvr>
-</p:notes>
-</file>
-
-<file path=ppt/notesSlides/notesSlide5.xml><?xml version="1.0" encoding="utf-8"?>
-<p:notes xmlns:a="http://schemas.openxmlformats.org/drawingml/2006/main" xmlns:r="http://schemas.openxmlformats.org/officeDocument/2006/relationships" xmlns:p="http://schemas.openxmlformats.org/presentationml/2006/main">
-  <p:cSld>
-    <p:spTree>
-      <p:nvGrpSpPr>
-        <p:cNvPr id="1" name=""/>
-        <p:cNvGrpSpPr/>
-        <p:nvPr/>
-      </p:nvGrpSpPr>
-      <p:grpSpPr>
-        <a:xfrm>
-          <a:off x="0" y="0"/>
-          <a:ext cx="0" cy="0"/>
-          <a:chOff x="0" y="0"/>
-          <a:chExt cx="0" cy="0"/>
-        </a:xfrm>
-      </p:grpSpPr>
-      <p:sp>
-        <p:nvSpPr>
-          <p:cNvPr id="2" name="Slide Image Placeholder 1"/>
-          <p:cNvSpPr>
-            <a:spLocks noGrp="1" noRot="1" noChangeAspect="1"/>
-          </p:cNvSpPr>
-          <p:nvPr>
-            <p:ph type="sldImg"/>
-          </p:nvPr>
-        </p:nvSpPr>
-        <p:spPr/>
-      </p:sp>
-      <p:sp>
-        <p:nvSpPr>
-          <p:cNvPr id="3" name="Notes Placeholder 2"/>
-          <p:cNvSpPr>
-            <a:spLocks noGrp="1"/>
-          </p:cNvSpPr>
-          <p:nvPr>
-            <p:ph type="body" idx="1"/>
-          </p:nvPr>
-        </p:nvSpPr>
-        <p:spPr/>
-        <p:txBody>
-          <a:bodyPr/>
-          <a:lstStyle/>
-          <a:p>
-            <a:r>
-              <a:rPr lang="en-GB" dirty="0"/>
-              <a:t>Neutral Stroop Instruction</a:t>
-            </a:r>
-            <a:endParaRPr lang="en-DK" dirty="0"/>
-          </a:p>
-        </p:txBody>
-      </p:sp>
-      <p:sp>
-        <p:nvSpPr>
-          <p:cNvPr id="4" name="Slide Number Placeholder 3"/>
-          <p:cNvSpPr>
-            <a:spLocks noGrp="1"/>
-          </p:cNvSpPr>
-          <p:nvPr>
-            <p:ph type="sldNum" sz="quarter" idx="5"/>
-          </p:nvPr>
-        </p:nvSpPr>
-        <p:spPr/>
-        <p:txBody>
-          <a:bodyPr/>
-          <a:lstStyle/>
-          <a:p>
-            <a:fld id="{B9B591FB-4521-4877-90E0-876AFC35B8BF}" type="slidenum">
-              <a:rPr lang="en-DK" smtClean="0"/>
-              <a:t>5</a:t>
-            </a:fld>
-            <a:endParaRPr lang="en-DK"/>
-          </a:p>
-        </p:txBody>
-      </p:sp>
-    </p:spTree>
-    <p:extLst>
-      <p:ext uri="{BB962C8B-B14F-4D97-AF65-F5344CB8AC3E}">
-        <p14:creationId xmlns:p14="http://schemas.microsoft.com/office/powerpoint/2010/main" val="3839840607"/>
-      </p:ext>
-    </p:extLst>
-  </p:cSld>
-  <p:clrMapOvr>
-    <a:masterClrMapping/>
-  </p:clrMapOvr>
-</p:notes>
-</file>
-
-<file path=ppt/notesSlides/notesSlide6.xml><?xml version="1.0" encoding="utf-8"?>
-<p:notes xmlns:a="http://schemas.openxmlformats.org/drawingml/2006/main" xmlns:r="http://schemas.openxmlformats.org/officeDocument/2006/relationships" xmlns:p="http://schemas.openxmlformats.org/presentationml/2006/main">
-  <p:cSld>
-    <p:spTree>
-      <p:nvGrpSpPr>
-        <p:cNvPr id="1" name=""/>
-        <p:cNvGrpSpPr/>
-        <p:nvPr/>
-      </p:nvGrpSpPr>
-      <p:grpSpPr>
-        <a:xfrm>
-          <a:off x="0" y="0"/>
-          <a:ext cx="0" cy="0"/>
-          <a:chOff x="0" y="0"/>
-          <a:chExt cx="0" cy="0"/>
-        </a:xfrm>
-      </p:grpSpPr>
-      <p:sp>
-        <p:nvSpPr>
-          <p:cNvPr id="2" name="Slide Image Placeholder 1"/>
-          <p:cNvSpPr>
-            <a:spLocks noGrp="1" noRot="1" noChangeAspect="1"/>
-          </p:cNvSpPr>
-          <p:nvPr>
-            <p:ph type="sldImg"/>
-          </p:nvPr>
-        </p:nvSpPr>
-        <p:spPr/>
-      </p:sp>
-      <p:sp>
-        <p:nvSpPr>
-          <p:cNvPr id="3" name="Notes Placeholder 2"/>
-          <p:cNvSpPr>
-            <a:spLocks noGrp="1"/>
-          </p:cNvSpPr>
-          <p:nvPr>
-            <p:ph type="body" idx="1"/>
-          </p:nvPr>
-        </p:nvSpPr>
-        <p:spPr/>
-        <p:txBody>
-          <a:bodyPr/>
-          <a:lstStyle/>
-          <a:p>
-            <a:r>
-              <a:rPr lang="en-GB" dirty="0"/>
-              <a:t>Neutral Stroop Instruction</a:t>
-            </a:r>
-            <a:endParaRPr lang="en-DK" dirty="0"/>
-          </a:p>
-        </p:txBody>
-      </p:sp>
-      <p:sp>
-        <p:nvSpPr>
-          <p:cNvPr id="4" name="Slide Number Placeholder 3"/>
-          <p:cNvSpPr>
-            <a:spLocks noGrp="1"/>
-          </p:cNvSpPr>
-          <p:nvPr>
-            <p:ph type="sldNum" sz="quarter" idx="5"/>
-          </p:nvPr>
-        </p:nvSpPr>
-        <p:spPr/>
-        <p:txBody>
-          <a:bodyPr/>
-          <a:lstStyle/>
-          <a:p>
-            <a:fld id="{B9B591FB-4521-4877-90E0-876AFC35B8BF}" type="slidenum">
-              <a:rPr lang="en-DK" smtClean="0"/>
-              <a:t>6</a:t>
-            </a:fld>
-            <a:endParaRPr lang="en-DK"/>
-          </a:p>
-        </p:txBody>
-      </p:sp>
-    </p:spTree>
-    <p:extLst>
-      <p:ext uri="{BB962C8B-B14F-4D97-AF65-F5344CB8AC3E}">
-        <p14:creationId xmlns:p14="http://schemas.microsoft.com/office/powerpoint/2010/main" val="2837589202"/>
-      </p:ext>
-    </p:extLst>
-  </p:cSld>
-  <p:clrMapOvr>
-    <a:masterClrMapping/>
-  </p:clrMapOvr>
-</p:notes>
-</file>
-
-<file path=ppt/notesSlides/notesSlide7.xml><?xml version="1.0" encoding="utf-8"?>
-<p:notes xmlns:a="http://schemas.openxmlformats.org/drawingml/2006/main" xmlns:r="http://schemas.openxmlformats.org/officeDocument/2006/relationships" xmlns:p="http://schemas.openxmlformats.org/presentationml/2006/main">
-  <p:cSld>
-    <p:spTree>
-      <p:nvGrpSpPr>
-        <p:cNvPr id="1" name=""/>
-        <p:cNvGrpSpPr/>
-        <p:nvPr/>
-      </p:nvGrpSpPr>
-      <p:grpSpPr>
-        <a:xfrm>
-          <a:off x="0" y="0"/>
-          <a:ext cx="0" cy="0"/>
-          <a:chOff x="0" y="0"/>
-          <a:chExt cx="0" cy="0"/>
-        </a:xfrm>
-      </p:grpSpPr>
-      <p:sp>
-        <p:nvSpPr>
-          <p:cNvPr id="2" name="Slide Image Placeholder 1"/>
-          <p:cNvSpPr>
-            <a:spLocks noGrp="1" noRot="1" noChangeAspect="1"/>
-          </p:cNvSpPr>
-          <p:nvPr>
-            <p:ph type="sldImg"/>
-          </p:nvPr>
-        </p:nvSpPr>
-        <p:spPr/>
-      </p:sp>
-      <p:sp>
-        <p:nvSpPr>
-          <p:cNvPr id="3" name="Notes Placeholder 2"/>
-          <p:cNvSpPr>
-            <a:spLocks noGrp="1"/>
-          </p:cNvSpPr>
-          <p:nvPr>
-            <p:ph type="body" idx="1"/>
-          </p:nvPr>
-        </p:nvSpPr>
-        <p:spPr/>
-        <p:txBody>
-          <a:bodyPr/>
-          <a:lstStyle/>
-          <a:p>
-            <a:r>
-              <a:rPr lang="en-GB" dirty="0"/>
-              <a:t>Neutral Stroop Instruction</a:t>
-            </a:r>
-            <a:endParaRPr lang="en-DK" dirty="0"/>
-          </a:p>
-        </p:txBody>
-      </p:sp>
-      <p:sp>
-        <p:nvSpPr>
-          <p:cNvPr id="4" name="Slide Number Placeholder 3"/>
-          <p:cNvSpPr>
-            <a:spLocks noGrp="1"/>
-          </p:cNvSpPr>
-          <p:nvPr>
-            <p:ph type="sldNum" sz="quarter" idx="5"/>
-          </p:nvPr>
-        </p:nvSpPr>
-        <p:spPr/>
-        <p:txBody>
-          <a:bodyPr/>
-          <a:lstStyle/>
-          <a:p>
-            <a:fld id="{B9B591FB-4521-4877-90E0-876AFC35B8BF}" type="slidenum">
-              <a:rPr lang="en-DK" smtClean="0"/>
-              <a:t>7</a:t>
-            </a:fld>
-            <a:endParaRPr lang="en-DK"/>
-          </a:p>
-        </p:txBody>
-      </p:sp>
-    </p:spTree>
-    <p:extLst>
-      <p:ext uri="{BB962C8B-B14F-4D97-AF65-F5344CB8AC3E}">
-        <p14:creationId xmlns:p14="http://schemas.microsoft.com/office/powerpoint/2010/main" val="2793537641"/>
-      </p:ext>
-    </p:extLst>
-  </p:cSld>
-  <p:clrMapOvr>
-    <a:masterClrMapping/>
-  </p:clrMapOvr>
-</p:notes>
-</file>
-
-<file path=ppt/notesSlides/notesSlide8.xml><?xml version="1.0" encoding="utf-8"?>
-<p:notes xmlns:a="http://schemas.openxmlformats.org/drawingml/2006/main" xmlns:r="http://schemas.openxmlformats.org/officeDocument/2006/relationships" xmlns:p="http://schemas.openxmlformats.org/presentationml/2006/main">
-  <p:cSld>
-    <p:spTree>
-      <p:nvGrpSpPr>
-        <p:cNvPr id="1" name=""/>
-        <p:cNvGrpSpPr/>
-        <p:nvPr/>
-      </p:nvGrpSpPr>
-      <p:grpSpPr>
-        <a:xfrm>
-          <a:off x="0" y="0"/>
-          <a:ext cx="0" cy="0"/>
-          <a:chOff x="0" y="0"/>
-          <a:chExt cx="0" cy="0"/>
-        </a:xfrm>
-      </p:grpSpPr>
-      <p:sp>
-        <p:nvSpPr>
-          <p:cNvPr id="2" name="Slide Image Placeholder 1"/>
-          <p:cNvSpPr>
-            <a:spLocks noGrp="1" noRot="1" noChangeAspect="1"/>
-          </p:cNvSpPr>
-          <p:nvPr>
-            <p:ph type="sldImg"/>
-          </p:nvPr>
-        </p:nvSpPr>
-        <p:spPr/>
-      </p:sp>
-      <p:sp>
-        <p:nvSpPr>
-          <p:cNvPr id="3" name="Notes Placeholder 2"/>
-          <p:cNvSpPr>
-            <a:spLocks noGrp="1"/>
-          </p:cNvSpPr>
-          <p:nvPr>
-            <p:ph type="body" idx="1"/>
-          </p:nvPr>
-        </p:nvSpPr>
-        <p:spPr/>
-        <p:txBody>
-          <a:bodyPr/>
-          <a:lstStyle/>
-          <a:p>
-            <a:r>
-              <a:rPr lang="en-GB" dirty="0"/>
-              <a:t>Neutral Stroop Instruction</a:t>
-            </a:r>
-            <a:endParaRPr lang="en-DK" dirty="0"/>
-          </a:p>
-        </p:txBody>
-      </p:sp>
-      <p:sp>
-        <p:nvSpPr>
-          <p:cNvPr id="4" name="Slide Number Placeholder 3"/>
-          <p:cNvSpPr>
-            <a:spLocks noGrp="1"/>
-          </p:cNvSpPr>
-          <p:nvPr>
-            <p:ph type="sldNum" sz="quarter" idx="5"/>
-          </p:nvPr>
-        </p:nvSpPr>
-        <p:spPr/>
-        <p:txBody>
-          <a:bodyPr/>
-          <a:lstStyle/>
-          <a:p>
-            <a:fld id="{B9B591FB-4521-4877-90E0-876AFC35B8BF}" type="slidenum">
-              <a:rPr lang="en-DK" smtClean="0"/>
-              <a:t>8</a:t>
             </a:fld>
             <a:endParaRPr lang="en-DK"/>
           </a:p>
@@ -1624,1144 +1308,6 @@
           <a:chExt cx="0" cy="0"/>
         </a:xfrm>
       </p:grpSpPr>
-      <p:sp>
-        <p:nvSpPr>
-          <p:cNvPr id="7" name="TextBox 6">
-            <a:extLst>
-              <a:ext uri="{FF2B5EF4-FFF2-40B4-BE49-F238E27FC236}">
-                <a16:creationId xmlns:a16="http://schemas.microsoft.com/office/drawing/2014/main" id="{72272CE1-E739-FDA7-3DE8-0908A2ED6630}"/>
-              </a:ext>
-            </a:extLst>
-          </p:cNvPr>
-          <p:cNvSpPr txBox="1"/>
-          <p:nvPr/>
-        </p:nvSpPr>
-        <p:spPr>
-          <a:xfrm>
-            <a:off x="1660338" y="563427"/>
-            <a:ext cx="9322189" cy="830997"/>
-          </a:xfrm>
-          <a:prstGeom prst="rect">
-            <a:avLst/>
-          </a:prstGeom>
-          <a:noFill/>
-        </p:spPr>
-        <p:txBody>
-          <a:bodyPr wrap="square" rtlCol="0">
-            <a:spAutoFit/>
-          </a:bodyPr>
-          <a:lstStyle/>
-          <a:p>
-            <a:pPr algn="ctr"/>
-            <a:r>
-              <a:rPr lang="en-GB" sz="2400" dirty="0"/>
-              <a:t>You will see a series of circles in red, green, blue or yellow. Press the button that correspond to the colour of the circle.</a:t>
-            </a:r>
-            <a:endParaRPr lang="en-DK" sz="2400" dirty="0"/>
-          </a:p>
-        </p:txBody>
-      </p:sp>
-      <p:sp>
-        <p:nvSpPr>
-          <p:cNvPr id="2" name="Oval 1">
-            <a:extLst>
-              <a:ext uri="{FF2B5EF4-FFF2-40B4-BE49-F238E27FC236}">
-                <a16:creationId xmlns:a16="http://schemas.microsoft.com/office/drawing/2014/main" id="{BD2D3368-47FB-87FE-CBDB-6ED8857547C7}"/>
-              </a:ext>
-            </a:extLst>
-          </p:cNvPr>
-          <p:cNvSpPr/>
-          <p:nvPr/>
-        </p:nvSpPr>
-        <p:spPr>
-          <a:xfrm>
-            <a:off x="2520521" y="3456743"/>
-            <a:ext cx="895547" cy="857839"/>
-          </a:xfrm>
-          <a:prstGeom prst="ellipse">
-            <a:avLst/>
-          </a:prstGeom>
-          <a:solidFill>
-            <a:srgbClr val="FF0000"/>
-          </a:solidFill>
-        </p:spPr>
-        <p:style>
-          <a:lnRef idx="2">
-            <a:schemeClr val="accent1">
-              <a:shade val="15000"/>
-            </a:schemeClr>
-          </a:lnRef>
-          <a:fillRef idx="1">
-            <a:schemeClr val="accent1"/>
-          </a:fillRef>
-          <a:effectRef idx="0">
-            <a:schemeClr val="accent1"/>
-          </a:effectRef>
-          <a:fontRef idx="minor">
-            <a:schemeClr val="lt1"/>
-          </a:fontRef>
-        </p:style>
-        <p:txBody>
-          <a:bodyPr rtlCol="0" anchor="ctr"/>
-          <a:lstStyle/>
-          <a:p>
-            <a:pPr algn="ctr"/>
-            <a:endParaRPr lang="en-DK" dirty="0">
-              <a:solidFill>
-                <a:schemeClr val="tx1"/>
-              </a:solidFill>
-            </a:endParaRPr>
-          </a:p>
-        </p:txBody>
-      </p:sp>
-      <p:grpSp>
-        <p:nvGrpSpPr>
-          <p:cNvPr id="17" name="Group 16">
-            <a:extLst>
-              <a:ext uri="{FF2B5EF4-FFF2-40B4-BE49-F238E27FC236}">
-                <a16:creationId xmlns:a16="http://schemas.microsoft.com/office/drawing/2014/main" id="{A883A668-808A-F7EA-127A-68FE65AB4561}"/>
-              </a:ext>
-            </a:extLst>
-          </p:cNvPr>
-          <p:cNvGrpSpPr/>
-          <p:nvPr/>
-        </p:nvGrpSpPr>
-        <p:grpSpPr>
-          <a:xfrm>
-            <a:off x="7165484" y="2154524"/>
-            <a:ext cx="4170157" cy="3336125"/>
-            <a:chOff x="7165484" y="2154524"/>
-            <a:chExt cx="4170157" cy="3336125"/>
-          </a:xfrm>
-        </p:grpSpPr>
-        <p:pic>
-          <p:nvPicPr>
-            <p:cNvPr id="13" name="Picture 12" descr="A close up of a game controller&#10;&#10;Description automatically generated">
-              <a:extLst>
-                <a:ext uri="{FF2B5EF4-FFF2-40B4-BE49-F238E27FC236}">
-                  <a16:creationId xmlns:a16="http://schemas.microsoft.com/office/drawing/2014/main" id="{2EB6067F-1DFE-0456-B180-882A09F43145}"/>
-                </a:ext>
-              </a:extLst>
-            </p:cNvPr>
-            <p:cNvPicPr>
-              <a:picLocks noChangeAspect="1"/>
-            </p:cNvPicPr>
-            <p:nvPr/>
-          </p:nvPicPr>
-          <p:blipFill>
-            <a:blip r:embed="rId3">
-              <a:extLst>
-                <a:ext uri="{28A0092B-C50C-407E-A947-70E740481C1C}">
-                  <a14:useLocalDpi xmlns:a14="http://schemas.microsoft.com/office/drawing/2010/main" val="0"/>
-                </a:ext>
-              </a:extLst>
-            </a:blip>
-            <a:stretch>
-              <a:fillRect/>
-            </a:stretch>
-          </p:blipFill>
-          <p:spPr>
-            <a:xfrm>
-              <a:off x="7165484" y="2154524"/>
-              <a:ext cx="4170157" cy="3336125"/>
-            </a:xfrm>
-            <a:prstGeom prst="rect">
-              <a:avLst/>
-            </a:prstGeom>
-          </p:spPr>
-        </p:pic>
-        <p:sp>
-          <p:nvSpPr>
-            <p:cNvPr id="3" name="Oval 2">
-              <a:extLst>
-                <a:ext uri="{FF2B5EF4-FFF2-40B4-BE49-F238E27FC236}">
-                  <a16:creationId xmlns:a16="http://schemas.microsoft.com/office/drawing/2014/main" id="{85609228-FA48-0048-4B3B-C470B4A2739B}"/>
-                </a:ext>
-              </a:extLst>
-            </p:cNvPr>
-            <p:cNvSpPr/>
-            <p:nvPr/>
-          </p:nvSpPr>
-          <p:spPr>
-            <a:xfrm>
-              <a:off x="8848854" y="3159000"/>
-              <a:ext cx="540000" cy="540000"/>
-            </a:xfrm>
-            <a:prstGeom prst="ellipse">
-              <a:avLst/>
-            </a:prstGeom>
-            <a:solidFill>
-              <a:srgbClr val="FF0000"/>
-            </a:solidFill>
-          </p:spPr>
-          <p:style>
-            <a:lnRef idx="2">
-              <a:schemeClr val="accent1">
-                <a:shade val="15000"/>
-              </a:schemeClr>
-            </a:lnRef>
-            <a:fillRef idx="1">
-              <a:schemeClr val="accent1"/>
-            </a:fillRef>
-            <a:effectRef idx="0">
-              <a:schemeClr val="accent1"/>
-            </a:effectRef>
-            <a:fontRef idx="minor">
-              <a:schemeClr val="lt1"/>
-            </a:fontRef>
-          </p:style>
-          <p:txBody>
-            <a:bodyPr rtlCol="0" anchor="ctr"/>
-            <a:lstStyle/>
-            <a:p>
-              <a:pPr algn="ctr"/>
-              <a:endParaRPr lang="en-DK" dirty="0">
-                <a:solidFill>
-                  <a:schemeClr val="tx1"/>
-                </a:solidFill>
-              </a:endParaRPr>
-            </a:p>
-          </p:txBody>
-        </p:sp>
-        <p:sp>
-          <p:nvSpPr>
-            <p:cNvPr id="8" name="Oval 7">
-              <a:extLst>
-                <a:ext uri="{FF2B5EF4-FFF2-40B4-BE49-F238E27FC236}">
-                  <a16:creationId xmlns:a16="http://schemas.microsoft.com/office/drawing/2014/main" id="{1A077E92-C2DB-66B6-BE4F-3AE5ADF39781}"/>
-                </a:ext>
-              </a:extLst>
-            </p:cNvPr>
-            <p:cNvSpPr/>
-            <p:nvPr/>
-          </p:nvSpPr>
-          <p:spPr>
-            <a:xfrm>
-              <a:off x="9463017" y="3730444"/>
-              <a:ext cx="540000" cy="540000"/>
-            </a:xfrm>
-            <a:prstGeom prst="ellipse">
-              <a:avLst/>
-            </a:prstGeom>
-            <a:solidFill>
-              <a:srgbClr val="00B050"/>
-            </a:solidFill>
-          </p:spPr>
-          <p:style>
-            <a:lnRef idx="2">
-              <a:schemeClr val="accent1">
-                <a:shade val="15000"/>
-              </a:schemeClr>
-            </a:lnRef>
-            <a:fillRef idx="1">
-              <a:schemeClr val="accent1"/>
-            </a:fillRef>
-            <a:effectRef idx="0">
-              <a:schemeClr val="accent1"/>
-            </a:effectRef>
-            <a:fontRef idx="minor">
-              <a:schemeClr val="lt1"/>
-            </a:fontRef>
-          </p:style>
-          <p:txBody>
-            <a:bodyPr rtlCol="0" anchor="ctr"/>
-            <a:lstStyle/>
-            <a:p>
-              <a:pPr algn="ctr"/>
-              <a:endParaRPr lang="en-DK" dirty="0">
-                <a:solidFill>
-                  <a:schemeClr val="tx1"/>
-                </a:solidFill>
-              </a:endParaRPr>
-            </a:p>
-          </p:txBody>
-        </p:sp>
-        <p:sp>
-          <p:nvSpPr>
-            <p:cNvPr id="9" name="Oval 8">
-              <a:extLst>
-                <a:ext uri="{FF2B5EF4-FFF2-40B4-BE49-F238E27FC236}">
-                  <a16:creationId xmlns:a16="http://schemas.microsoft.com/office/drawing/2014/main" id="{C3EE3612-A434-5D49-786C-189B8865D17B}"/>
-                </a:ext>
-              </a:extLst>
-            </p:cNvPr>
-            <p:cNvSpPr/>
-            <p:nvPr/>
-          </p:nvSpPr>
-          <p:spPr>
-            <a:xfrm>
-              <a:off x="8848854" y="4358663"/>
-              <a:ext cx="540000" cy="540000"/>
-            </a:xfrm>
-            <a:prstGeom prst="ellipse">
-              <a:avLst/>
-            </a:prstGeom>
-          </p:spPr>
-          <p:style>
-            <a:lnRef idx="2">
-              <a:schemeClr val="accent1">
-                <a:shade val="15000"/>
-              </a:schemeClr>
-            </a:lnRef>
-            <a:fillRef idx="1">
-              <a:schemeClr val="accent1"/>
-            </a:fillRef>
-            <a:effectRef idx="0">
-              <a:schemeClr val="accent1"/>
-            </a:effectRef>
-            <a:fontRef idx="minor">
-              <a:schemeClr val="lt1"/>
-            </a:fontRef>
-          </p:style>
-          <p:txBody>
-            <a:bodyPr rtlCol="0" anchor="ctr"/>
-            <a:lstStyle/>
-            <a:p>
-              <a:pPr algn="ctr"/>
-              <a:endParaRPr lang="en-DK" dirty="0">
-                <a:solidFill>
-                  <a:schemeClr val="tx1"/>
-                </a:solidFill>
-              </a:endParaRPr>
-            </a:p>
-          </p:txBody>
-        </p:sp>
-        <p:sp>
-          <p:nvSpPr>
-            <p:cNvPr id="10" name="Oval 9">
-              <a:extLst>
-                <a:ext uri="{FF2B5EF4-FFF2-40B4-BE49-F238E27FC236}">
-                  <a16:creationId xmlns:a16="http://schemas.microsoft.com/office/drawing/2014/main" id="{92EB3F72-8DEE-AB6D-1209-934BDB9E9B00}"/>
-                </a:ext>
-              </a:extLst>
-            </p:cNvPr>
-            <p:cNvSpPr/>
-            <p:nvPr/>
-          </p:nvSpPr>
-          <p:spPr>
-            <a:xfrm>
-              <a:off x="8180116" y="3730444"/>
-              <a:ext cx="540000" cy="540000"/>
-            </a:xfrm>
-            <a:prstGeom prst="ellipse">
-              <a:avLst/>
-            </a:prstGeom>
-            <a:solidFill>
-              <a:srgbClr val="FFFF00"/>
-            </a:solidFill>
-          </p:spPr>
-          <p:style>
-            <a:lnRef idx="2">
-              <a:schemeClr val="accent1">
-                <a:shade val="15000"/>
-              </a:schemeClr>
-            </a:lnRef>
-            <a:fillRef idx="1">
-              <a:schemeClr val="accent1"/>
-            </a:fillRef>
-            <a:effectRef idx="0">
-              <a:schemeClr val="accent1"/>
-            </a:effectRef>
-            <a:fontRef idx="minor">
-              <a:schemeClr val="lt1"/>
-            </a:fontRef>
-          </p:style>
-          <p:txBody>
-            <a:bodyPr rtlCol="0" anchor="ctr"/>
-            <a:lstStyle/>
-            <a:p>
-              <a:pPr algn="ctr"/>
-              <a:endParaRPr lang="en-DK" dirty="0">
-                <a:solidFill>
-                  <a:schemeClr val="bg1"/>
-                </a:solidFill>
-              </a:endParaRPr>
-            </a:p>
-          </p:txBody>
-        </p:sp>
-      </p:grpSp>
-      <p:sp>
-        <p:nvSpPr>
-          <p:cNvPr id="6" name="Rectangle 5">
-            <a:extLst>
-              <a:ext uri="{FF2B5EF4-FFF2-40B4-BE49-F238E27FC236}">
-                <a16:creationId xmlns:a16="http://schemas.microsoft.com/office/drawing/2014/main" id="{5D665CC8-E90C-65A8-B776-5346BD8EA89A}"/>
-              </a:ext>
-            </a:extLst>
-          </p:cNvPr>
-          <p:cNvSpPr/>
-          <p:nvPr/>
-        </p:nvSpPr>
-        <p:spPr>
-          <a:xfrm>
-            <a:off x="589530" y="2280677"/>
-            <a:ext cx="4757530" cy="3209972"/>
-          </a:xfrm>
-          <a:prstGeom prst="rect">
-            <a:avLst/>
-          </a:prstGeom>
-          <a:noFill/>
-          <a:ln w="19050">
-            <a:solidFill>
-              <a:schemeClr val="tx1"/>
-            </a:solidFill>
-          </a:ln>
-        </p:spPr>
-        <p:style>
-          <a:lnRef idx="2">
-            <a:schemeClr val="accent1">
-              <a:shade val="15000"/>
-            </a:schemeClr>
-          </a:lnRef>
-          <a:fillRef idx="1">
-            <a:schemeClr val="accent1"/>
-          </a:fillRef>
-          <a:effectRef idx="0">
-            <a:schemeClr val="accent1"/>
-          </a:effectRef>
-          <a:fontRef idx="minor">
-            <a:schemeClr val="lt1"/>
-          </a:fontRef>
-        </p:style>
-        <p:txBody>
-          <a:bodyPr rtlCol="0" anchor="ctr"/>
-          <a:lstStyle/>
-          <a:p>
-            <a:pPr algn="ctr"/>
-            <a:endParaRPr lang="en-DK"/>
-          </a:p>
-        </p:txBody>
-      </p:sp>
-      <p:sp>
-        <p:nvSpPr>
-          <p:cNvPr id="12" name="TextBox 11">
-            <a:extLst>
-              <a:ext uri="{FF2B5EF4-FFF2-40B4-BE49-F238E27FC236}">
-                <a16:creationId xmlns:a16="http://schemas.microsoft.com/office/drawing/2014/main" id="{0F866BCD-13EE-9EF1-3D07-14EEDEC94D7B}"/>
-              </a:ext>
-            </a:extLst>
-          </p:cNvPr>
-          <p:cNvSpPr txBox="1"/>
-          <p:nvPr/>
-        </p:nvSpPr>
-        <p:spPr>
-          <a:xfrm>
-            <a:off x="7014752" y="1853006"/>
-            <a:ext cx="4170157" cy="646331"/>
-          </a:xfrm>
-          <a:prstGeom prst="rect">
-            <a:avLst/>
-          </a:prstGeom>
-          <a:noFill/>
-        </p:spPr>
-        <p:txBody>
-          <a:bodyPr wrap="square" rtlCol="0">
-            <a:spAutoFit/>
-          </a:bodyPr>
-          <a:lstStyle/>
-          <a:p>
-            <a:r>
-              <a:rPr lang="en-GB" dirty="0"/>
-              <a:t>In this case press the RED button, because the circle is red.</a:t>
-            </a:r>
-            <a:endParaRPr lang="en-DK" dirty="0"/>
-          </a:p>
-        </p:txBody>
-      </p:sp>
-      <p:cxnSp>
-        <p:nvCxnSpPr>
-          <p:cNvPr id="14" name="Straight Arrow Connector 13">
-            <a:extLst>
-              <a:ext uri="{FF2B5EF4-FFF2-40B4-BE49-F238E27FC236}">
-                <a16:creationId xmlns:a16="http://schemas.microsoft.com/office/drawing/2014/main" id="{04189940-EC9A-C630-696D-E89126282625}"/>
-              </a:ext>
-            </a:extLst>
-          </p:cNvPr>
-          <p:cNvCxnSpPr>
-            <a:stCxn id="12" idx="2"/>
-            <a:endCxn id="3" idx="0"/>
-          </p:cNvCxnSpPr>
-          <p:nvPr/>
-        </p:nvCxnSpPr>
-        <p:spPr>
-          <a:xfrm>
-            <a:off x="9099831" y="2499337"/>
-            <a:ext cx="19023" cy="659663"/>
-          </a:xfrm>
-          <a:prstGeom prst="straightConnector1">
-            <a:avLst/>
-          </a:prstGeom>
-          <a:ln w="38100">
-            <a:solidFill>
-              <a:schemeClr val="tx1"/>
-            </a:solidFill>
-            <a:tailEnd type="triangle"/>
-          </a:ln>
-        </p:spPr>
-        <p:style>
-          <a:lnRef idx="1">
-            <a:schemeClr val="accent1"/>
-          </a:lnRef>
-          <a:fillRef idx="0">
-            <a:schemeClr val="accent1"/>
-          </a:fillRef>
-          <a:effectRef idx="0">
-            <a:schemeClr val="accent1"/>
-          </a:effectRef>
-          <a:fontRef idx="minor">
-            <a:schemeClr val="tx1"/>
-          </a:fontRef>
-        </p:style>
-      </p:cxnSp>
-      <p:sp>
-        <p:nvSpPr>
-          <p:cNvPr id="15" name="Arrow: Right 14">
-            <a:extLst>
-              <a:ext uri="{FF2B5EF4-FFF2-40B4-BE49-F238E27FC236}">
-                <a16:creationId xmlns:a16="http://schemas.microsoft.com/office/drawing/2014/main" id="{148741A0-C0A6-E6D1-2CC9-57459D2FBEA5}"/>
-              </a:ext>
-            </a:extLst>
-          </p:cNvPr>
-          <p:cNvSpPr/>
-          <p:nvPr/>
-        </p:nvSpPr>
-        <p:spPr>
-          <a:xfrm>
-            <a:off x="5945645" y="3456742"/>
-            <a:ext cx="887896" cy="857839"/>
-          </a:xfrm>
-          <a:prstGeom prst="rightArrow">
-            <a:avLst/>
-          </a:prstGeom>
-          <a:solidFill>
-            <a:schemeClr val="tx1"/>
-          </a:solidFill>
-          <a:ln>
-            <a:solidFill>
-              <a:schemeClr val="tx1"/>
-            </a:solidFill>
-          </a:ln>
-        </p:spPr>
-        <p:style>
-          <a:lnRef idx="2">
-            <a:schemeClr val="accent1">
-              <a:shade val="15000"/>
-            </a:schemeClr>
-          </a:lnRef>
-          <a:fillRef idx="1">
-            <a:schemeClr val="accent1"/>
-          </a:fillRef>
-          <a:effectRef idx="0">
-            <a:schemeClr val="accent1"/>
-          </a:effectRef>
-          <a:fontRef idx="minor">
-            <a:schemeClr val="lt1"/>
-          </a:fontRef>
-        </p:style>
-        <p:txBody>
-          <a:bodyPr rtlCol="0" anchor="ctr"/>
-          <a:lstStyle/>
-          <a:p>
-            <a:pPr algn="ctr"/>
-            <a:endParaRPr lang="en-DK"/>
-          </a:p>
-        </p:txBody>
-      </p:sp>
-    </p:spTree>
-    <p:extLst>
-      <p:ext uri="{BB962C8B-B14F-4D97-AF65-F5344CB8AC3E}">
-        <p14:creationId xmlns:p14="http://schemas.microsoft.com/office/powerpoint/2010/main" val="2008620388"/>
-      </p:ext>
-    </p:extLst>
-  </p:cSld>
-  <p:clrMapOvr>
-    <a:masterClrMapping/>
-  </p:clrMapOvr>
-</p:sld>
-</file>
-
-<file path=ppt/slides/slide2.xml><?xml version="1.0" encoding="utf-8"?>
-<p:sld xmlns:a="http://schemas.openxmlformats.org/drawingml/2006/main" xmlns:r="http://schemas.openxmlformats.org/officeDocument/2006/relationships" xmlns:p="http://schemas.openxmlformats.org/presentationml/2006/main">
-  <p:cSld>
-    <p:spTree>
-      <p:nvGrpSpPr>
-        <p:cNvPr id="1" name=""/>
-        <p:cNvGrpSpPr/>
-        <p:nvPr/>
-      </p:nvGrpSpPr>
-      <p:grpSpPr>
-        <a:xfrm>
-          <a:off x="0" y="0"/>
-          <a:ext cx="0" cy="0"/>
-          <a:chOff x="0" y="0"/>
-          <a:chExt cx="0" cy="0"/>
-        </a:xfrm>
-      </p:grpSpPr>
-      <p:sp>
-        <p:nvSpPr>
-          <p:cNvPr id="6" name="Rectangle 5">
-            <a:extLst>
-              <a:ext uri="{FF2B5EF4-FFF2-40B4-BE49-F238E27FC236}">
-                <a16:creationId xmlns:a16="http://schemas.microsoft.com/office/drawing/2014/main" id="{5D665CC8-E90C-65A8-B776-5346BD8EA89A}"/>
-              </a:ext>
-            </a:extLst>
-          </p:cNvPr>
-          <p:cNvSpPr/>
-          <p:nvPr/>
-        </p:nvSpPr>
-        <p:spPr>
-          <a:xfrm>
-            <a:off x="589530" y="2280677"/>
-            <a:ext cx="4757530" cy="3209972"/>
-          </a:xfrm>
-          <a:prstGeom prst="rect">
-            <a:avLst/>
-          </a:prstGeom>
-          <a:noFill/>
-          <a:ln w="19050">
-            <a:solidFill>
-              <a:schemeClr val="tx1"/>
-            </a:solidFill>
-          </a:ln>
-        </p:spPr>
-        <p:style>
-          <a:lnRef idx="2">
-            <a:schemeClr val="accent1">
-              <a:shade val="15000"/>
-            </a:schemeClr>
-          </a:lnRef>
-          <a:fillRef idx="1">
-            <a:schemeClr val="accent1"/>
-          </a:fillRef>
-          <a:effectRef idx="0">
-            <a:schemeClr val="accent1"/>
-          </a:effectRef>
-          <a:fontRef idx="minor">
-            <a:schemeClr val="lt1"/>
-          </a:fontRef>
-        </p:style>
-        <p:txBody>
-          <a:bodyPr rtlCol="0" anchor="ctr"/>
-          <a:lstStyle/>
-          <a:p>
-            <a:pPr algn="ctr"/>
-            <a:endParaRPr lang="en-DK"/>
-          </a:p>
-        </p:txBody>
-      </p:sp>
-      <p:sp>
-        <p:nvSpPr>
-          <p:cNvPr id="15" name="Arrow: Right 14">
-            <a:extLst>
-              <a:ext uri="{FF2B5EF4-FFF2-40B4-BE49-F238E27FC236}">
-                <a16:creationId xmlns:a16="http://schemas.microsoft.com/office/drawing/2014/main" id="{148741A0-C0A6-E6D1-2CC9-57459D2FBEA5}"/>
-              </a:ext>
-            </a:extLst>
-          </p:cNvPr>
-          <p:cNvSpPr/>
-          <p:nvPr/>
-        </p:nvSpPr>
-        <p:spPr>
-          <a:xfrm>
-            <a:off x="5945645" y="3456742"/>
-            <a:ext cx="887896" cy="857839"/>
-          </a:xfrm>
-          <a:prstGeom prst="rightArrow">
-            <a:avLst/>
-          </a:prstGeom>
-          <a:solidFill>
-            <a:schemeClr val="tx1"/>
-          </a:solidFill>
-          <a:ln>
-            <a:solidFill>
-              <a:schemeClr val="tx1"/>
-            </a:solidFill>
-          </a:ln>
-        </p:spPr>
-        <p:style>
-          <a:lnRef idx="2">
-            <a:schemeClr val="accent1">
-              <a:shade val="15000"/>
-            </a:schemeClr>
-          </a:lnRef>
-          <a:fillRef idx="1">
-            <a:schemeClr val="accent1"/>
-          </a:fillRef>
-          <a:effectRef idx="0">
-            <a:schemeClr val="accent1"/>
-          </a:effectRef>
-          <a:fontRef idx="minor">
-            <a:schemeClr val="lt1"/>
-          </a:fontRef>
-        </p:style>
-        <p:txBody>
-          <a:bodyPr rtlCol="0" anchor="ctr"/>
-          <a:lstStyle/>
-          <a:p>
-            <a:pPr algn="ctr"/>
-            <a:endParaRPr lang="en-DK"/>
-          </a:p>
-        </p:txBody>
-      </p:sp>
-      <p:sp>
-        <p:nvSpPr>
-          <p:cNvPr id="4" name="TextBox 3">
-            <a:extLst>
-              <a:ext uri="{FF2B5EF4-FFF2-40B4-BE49-F238E27FC236}">
-                <a16:creationId xmlns:a16="http://schemas.microsoft.com/office/drawing/2014/main" id="{9BC7286E-540A-E2B3-D8AD-727E82267F80}"/>
-              </a:ext>
-            </a:extLst>
-          </p:cNvPr>
-          <p:cNvSpPr txBox="1"/>
-          <p:nvPr/>
-        </p:nvSpPr>
-        <p:spPr>
-          <a:xfrm>
-            <a:off x="1660339" y="563427"/>
-            <a:ext cx="9134272" cy="830997"/>
-          </a:xfrm>
-          <a:prstGeom prst="rect">
-            <a:avLst/>
-          </a:prstGeom>
-          <a:noFill/>
-        </p:spPr>
-        <p:txBody>
-          <a:bodyPr wrap="square" rtlCol="0">
-            <a:spAutoFit/>
-          </a:bodyPr>
-          <a:lstStyle/>
-          <a:p>
-            <a:pPr algn="ctr"/>
-            <a:r>
-              <a:rPr lang="en-GB" sz="2400" dirty="0"/>
-              <a:t>You will see a series of words written in red, green, blue or yellow. Press the button that correspond to the colour the word is written in.</a:t>
-            </a:r>
-            <a:endParaRPr lang="en-DK" sz="2400" dirty="0"/>
-          </a:p>
-        </p:txBody>
-      </p:sp>
-      <p:sp>
-        <p:nvSpPr>
-          <p:cNvPr id="13" name="TextBox 12">
-            <a:extLst>
-              <a:ext uri="{FF2B5EF4-FFF2-40B4-BE49-F238E27FC236}">
-                <a16:creationId xmlns:a16="http://schemas.microsoft.com/office/drawing/2014/main" id="{38969B68-7DE4-4BA1-511B-75BBBF64D129}"/>
-              </a:ext>
-            </a:extLst>
-          </p:cNvPr>
-          <p:cNvSpPr txBox="1"/>
-          <p:nvPr/>
-        </p:nvSpPr>
-        <p:spPr>
-          <a:xfrm>
-            <a:off x="2158618" y="3531718"/>
-            <a:ext cx="1619354" cy="707886"/>
-          </a:xfrm>
-          <a:prstGeom prst="rect">
-            <a:avLst/>
-          </a:prstGeom>
-          <a:noFill/>
-        </p:spPr>
-        <p:txBody>
-          <a:bodyPr wrap="none" rtlCol="0">
-            <a:spAutoFit/>
-          </a:bodyPr>
-          <a:lstStyle/>
-          <a:p>
-            <a:r>
-              <a:rPr lang="en-GB" sz="4000" dirty="0">
-                <a:solidFill>
-                  <a:srgbClr val="FF0000"/>
-                </a:solidFill>
-              </a:rPr>
-              <a:t>GREEN</a:t>
-            </a:r>
-            <a:endParaRPr lang="en-DK" sz="4000" dirty="0">
-              <a:solidFill>
-                <a:srgbClr val="FF0000"/>
-              </a:solidFill>
-            </a:endParaRPr>
-          </a:p>
-        </p:txBody>
-      </p:sp>
-      <p:grpSp>
-        <p:nvGrpSpPr>
-          <p:cNvPr id="2" name="Group 1">
-            <a:extLst>
-              <a:ext uri="{FF2B5EF4-FFF2-40B4-BE49-F238E27FC236}">
-                <a16:creationId xmlns:a16="http://schemas.microsoft.com/office/drawing/2014/main" id="{BCE89C1C-9577-EAFD-F0B5-6D0858333246}"/>
-              </a:ext>
-            </a:extLst>
-          </p:cNvPr>
-          <p:cNvGrpSpPr/>
-          <p:nvPr/>
-        </p:nvGrpSpPr>
-        <p:grpSpPr>
-          <a:xfrm>
-            <a:off x="7165484" y="2154524"/>
-            <a:ext cx="4170157" cy="3336125"/>
-            <a:chOff x="7165484" y="2154524"/>
-            <a:chExt cx="4170157" cy="3336125"/>
-          </a:xfrm>
-        </p:grpSpPr>
-        <p:pic>
-          <p:nvPicPr>
-            <p:cNvPr id="7" name="Picture 6" descr="A close up of a game controller&#10;&#10;Description automatically generated">
-              <a:extLst>
-                <a:ext uri="{FF2B5EF4-FFF2-40B4-BE49-F238E27FC236}">
-                  <a16:creationId xmlns:a16="http://schemas.microsoft.com/office/drawing/2014/main" id="{5C0EA49A-66E5-4EB1-EE39-5D1689CC243A}"/>
-                </a:ext>
-              </a:extLst>
-            </p:cNvPr>
-            <p:cNvPicPr>
-              <a:picLocks noChangeAspect="1"/>
-            </p:cNvPicPr>
-            <p:nvPr/>
-          </p:nvPicPr>
-          <p:blipFill>
-            <a:blip r:embed="rId3">
-              <a:extLst>
-                <a:ext uri="{28A0092B-C50C-407E-A947-70E740481C1C}">
-                  <a14:useLocalDpi xmlns:a14="http://schemas.microsoft.com/office/drawing/2010/main" val="0"/>
-                </a:ext>
-              </a:extLst>
-            </a:blip>
-            <a:stretch>
-              <a:fillRect/>
-            </a:stretch>
-          </p:blipFill>
-          <p:spPr>
-            <a:xfrm>
-              <a:off x="7165484" y="2154524"/>
-              <a:ext cx="4170157" cy="3336125"/>
-            </a:xfrm>
-            <a:prstGeom prst="rect">
-              <a:avLst/>
-            </a:prstGeom>
-          </p:spPr>
-        </p:pic>
-        <p:sp>
-          <p:nvSpPr>
-            <p:cNvPr id="16" name="Oval 15">
-              <a:extLst>
-                <a:ext uri="{FF2B5EF4-FFF2-40B4-BE49-F238E27FC236}">
-                  <a16:creationId xmlns:a16="http://schemas.microsoft.com/office/drawing/2014/main" id="{93D4336A-2022-4847-56F2-11CDDD6E6400}"/>
-                </a:ext>
-              </a:extLst>
-            </p:cNvPr>
-            <p:cNvSpPr/>
-            <p:nvPr/>
-          </p:nvSpPr>
-          <p:spPr>
-            <a:xfrm>
-              <a:off x="8848854" y="3159000"/>
-              <a:ext cx="540000" cy="540000"/>
-            </a:xfrm>
-            <a:prstGeom prst="ellipse">
-              <a:avLst/>
-            </a:prstGeom>
-            <a:solidFill>
-              <a:srgbClr val="FF0000"/>
-            </a:solidFill>
-          </p:spPr>
-          <p:style>
-            <a:lnRef idx="2">
-              <a:schemeClr val="accent1">
-                <a:shade val="15000"/>
-              </a:schemeClr>
-            </a:lnRef>
-            <a:fillRef idx="1">
-              <a:schemeClr val="accent1"/>
-            </a:fillRef>
-            <a:effectRef idx="0">
-              <a:schemeClr val="accent1"/>
-            </a:effectRef>
-            <a:fontRef idx="minor">
-              <a:schemeClr val="lt1"/>
-            </a:fontRef>
-          </p:style>
-          <p:txBody>
-            <a:bodyPr rtlCol="0" anchor="ctr"/>
-            <a:lstStyle/>
-            <a:p>
-              <a:pPr algn="ctr"/>
-              <a:endParaRPr lang="en-DK" dirty="0">
-                <a:solidFill>
-                  <a:schemeClr val="tx1"/>
-                </a:solidFill>
-              </a:endParaRPr>
-            </a:p>
-          </p:txBody>
-        </p:sp>
-        <p:sp>
-          <p:nvSpPr>
-            <p:cNvPr id="17" name="Oval 16">
-              <a:extLst>
-                <a:ext uri="{FF2B5EF4-FFF2-40B4-BE49-F238E27FC236}">
-                  <a16:creationId xmlns:a16="http://schemas.microsoft.com/office/drawing/2014/main" id="{06DF4056-9723-94E7-02B7-05E46FECA455}"/>
-                </a:ext>
-              </a:extLst>
-            </p:cNvPr>
-            <p:cNvSpPr/>
-            <p:nvPr/>
-          </p:nvSpPr>
-          <p:spPr>
-            <a:xfrm>
-              <a:off x="9463017" y="3730444"/>
-              <a:ext cx="540000" cy="540000"/>
-            </a:xfrm>
-            <a:prstGeom prst="ellipse">
-              <a:avLst/>
-            </a:prstGeom>
-            <a:solidFill>
-              <a:srgbClr val="00B050"/>
-            </a:solidFill>
-          </p:spPr>
-          <p:style>
-            <a:lnRef idx="2">
-              <a:schemeClr val="accent1">
-                <a:shade val="15000"/>
-              </a:schemeClr>
-            </a:lnRef>
-            <a:fillRef idx="1">
-              <a:schemeClr val="accent1"/>
-            </a:fillRef>
-            <a:effectRef idx="0">
-              <a:schemeClr val="accent1"/>
-            </a:effectRef>
-            <a:fontRef idx="minor">
-              <a:schemeClr val="lt1"/>
-            </a:fontRef>
-          </p:style>
-          <p:txBody>
-            <a:bodyPr rtlCol="0" anchor="ctr"/>
-            <a:lstStyle/>
-            <a:p>
-              <a:pPr algn="ctr"/>
-              <a:endParaRPr lang="en-DK" dirty="0">
-                <a:solidFill>
-                  <a:schemeClr val="tx1"/>
-                </a:solidFill>
-              </a:endParaRPr>
-            </a:p>
-          </p:txBody>
-        </p:sp>
-        <p:sp>
-          <p:nvSpPr>
-            <p:cNvPr id="18" name="Oval 17">
-              <a:extLst>
-                <a:ext uri="{FF2B5EF4-FFF2-40B4-BE49-F238E27FC236}">
-                  <a16:creationId xmlns:a16="http://schemas.microsoft.com/office/drawing/2014/main" id="{D486688C-8C72-A1AA-BAFD-51761749EF60}"/>
-                </a:ext>
-              </a:extLst>
-            </p:cNvPr>
-            <p:cNvSpPr/>
-            <p:nvPr/>
-          </p:nvSpPr>
-          <p:spPr>
-            <a:xfrm>
-              <a:off x="8848854" y="4358663"/>
-              <a:ext cx="540000" cy="540000"/>
-            </a:xfrm>
-            <a:prstGeom prst="ellipse">
-              <a:avLst/>
-            </a:prstGeom>
-          </p:spPr>
-          <p:style>
-            <a:lnRef idx="2">
-              <a:schemeClr val="accent1">
-                <a:shade val="15000"/>
-              </a:schemeClr>
-            </a:lnRef>
-            <a:fillRef idx="1">
-              <a:schemeClr val="accent1"/>
-            </a:fillRef>
-            <a:effectRef idx="0">
-              <a:schemeClr val="accent1"/>
-            </a:effectRef>
-            <a:fontRef idx="minor">
-              <a:schemeClr val="lt1"/>
-            </a:fontRef>
-          </p:style>
-          <p:txBody>
-            <a:bodyPr rtlCol="0" anchor="ctr"/>
-            <a:lstStyle/>
-            <a:p>
-              <a:pPr algn="ctr"/>
-              <a:endParaRPr lang="en-DK" dirty="0">
-                <a:solidFill>
-                  <a:schemeClr val="tx1"/>
-                </a:solidFill>
-              </a:endParaRPr>
-            </a:p>
-          </p:txBody>
-        </p:sp>
-        <p:sp>
-          <p:nvSpPr>
-            <p:cNvPr id="19" name="Oval 18">
-              <a:extLst>
-                <a:ext uri="{FF2B5EF4-FFF2-40B4-BE49-F238E27FC236}">
-                  <a16:creationId xmlns:a16="http://schemas.microsoft.com/office/drawing/2014/main" id="{02E9ADCD-4439-04BC-EC2B-F6D63F9022FA}"/>
-                </a:ext>
-              </a:extLst>
-            </p:cNvPr>
-            <p:cNvSpPr/>
-            <p:nvPr/>
-          </p:nvSpPr>
-          <p:spPr>
-            <a:xfrm>
-              <a:off x="8180116" y="3730444"/>
-              <a:ext cx="540000" cy="540000"/>
-            </a:xfrm>
-            <a:prstGeom prst="ellipse">
-              <a:avLst/>
-            </a:prstGeom>
-            <a:solidFill>
-              <a:srgbClr val="FFFF00"/>
-            </a:solidFill>
-          </p:spPr>
-          <p:style>
-            <a:lnRef idx="2">
-              <a:schemeClr val="accent1">
-                <a:shade val="15000"/>
-              </a:schemeClr>
-            </a:lnRef>
-            <a:fillRef idx="1">
-              <a:schemeClr val="accent1"/>
-            </a:fillRef>
-            <a:effectRef idx="0">
-              <a:schemeClr val="accent1"/>
-            </a:effectRef>
-            <a:fontRef idx="minor">
-              <a:schemeClr val="lt1"/>
-            </a:fontRef>
-          </p:style>
-          <p:txBody>
-            <a:bodyPr rtlCol="0" anchor="ctr"/>
-            <a:lstStyle/>
-            <a:p>
-              <a:pPr algn="ctr"/>
-              <a:endParaRPr lang="en-DK" dirty="0">
-                <a:solidFill>
-                  <a:schemeClr val="bg1"/>
-                </a:solidFill>
-              </a:endParaRPr>
-            </a:p>
-          </p:txBody>
-        </p:sp>
-      </p:grpSp>
-      <p:sp>
-        <p:nvSpPr>
-          <p:cNvPr id="12" name="TextBox 11">
-            <a:extLst>
-              <a:ext uri="{FF2B5EF4-FFF2-40B4-BE49-F238E27FC236}">
-                <a16:creationId xmlns:a16="http://schemas.microsoft.com/office/drawing/2014/main" id="{0F866BCD-13EE-9EF1-3D07-14EEDEC94D7B}"/>
-              </a:ext>
-            </a:extLst>
-          </p:cNvPr>
-          <p:cNvSpPr txBox="1"/>
-          <p:nvPr/>
-        </p:nvSpPr>
-        <p:spPr>
-          <a:xfrm>
-            <a:off x="7001500" y="1594592"/>
-            <a:ext cx="4170157" cy="646331"/>
-          </a:xfrm>
-          <a:prstGeom prst="rect">
-            <a:avLst/>
-          </a:prstGeom>
-          <a:noFill/>
-        </p:spPr>
-        <p:txBody>
-          <a:bodyPr wrap="square" rtlCol="0">
-            <a:spAutoFit/>
-          </a:bodyPr>
-          <a:lstStyle/>
-          <a:p>
-            <a:r>
-              <a:rPr lang="en-GB" dirty="0"/>
-              <a:t>In this case press the RED button, because the word is written in red.</a:t>
-            </a:r>
-            <a:endParaRPr lang="en-DK" dirty="0"/>
-          </a:p>
-        </p:txBody>
-      </p:sp>
-      <p:cxnSp>
-        <p:nvCxnSpPr>
-          <p:cNvPr id="14" name="Straight Arrow Connector 13">
-            <a:extLst>
-              <a:ext uri="{FF2B5EF4-FFF2-40B4-BE49-F238E27FC236}">
-                <a16:creationId xmlns:a16="http://schemas.microsoft.com/office/drawing/2014/main" id="{04189940-EC9A-C630-696D-E89126282625}"/>
-              </a:ext>
-            </a:extLst>
-          </p:cNvPr>
-          <p:cNvCxnSpPr>
-            <a:cxnSpLocks/>
-            <a:stCxn id="12" idx="2"/>
-            <a:endCxn id="16" idx="0"/>
-          </p:cNvCxnSpPr>
-          <p:nvPr/>
-        </p:nvCxnSpPr>
-        <p:spPr>
-          <a:xfrm>
-            <a:off x="9086579" y="2240923"/>
-            <a:ext cx="32275" cy="918077"/>
-          </a:xfrm>
-          <a:prstGeom prst="straightConnector1">
-            <a:avLst/>
-          </a:prstGeom>
-          <a:ln w="38100">
-            <a:solidFill>
-              <a:schemeClr val="tx1"/>
-            </a:solidFill>
-            <a:tailEnd type="triangle"/>
-          </a:ln>
-        </p:spPr>
-        <p:style>
-          <a:lnRef idx="1">
-            <a:schemeClr val="accent1"/>
-          </a:lnRef>
-          <a:fillRef idx="0">
-            <a:schemeClr val="accent1"/>
-          </a:fillRef>
-          <a:effectRef idx="0">
-            <a:schemeClr val="accent1"/>
-          </a:effectRef>
-          <a:fontRef idx="minor">
-            <a:schemeClr val="tx1"/>
-          </a:fontRef>
-        </p:style>
-      </p:cxnSp>
-    </p:spTree>
-    <p:extLst>
-      <p:ext uri="{BB962C8B-B14F-4D97-AF65-F5344CB8AC3E}">
-        <p14:creationId xmlns:p14="http://schemas.microsoft.com/office/powerpoint/2010/main" val="2080299155"/>
-      </p:ext>
-    </p:extLst>
-  </p:cSld>
-  <p:clrMapOvr>
-    <a:masterClrMapping/>
-  </p:clrMapOvr>
-</p:sld>
-</file>
-
-<file path=ppt/slides/slide3.xml><?xml version="1.0" encoding="utf-8"?>
-<p:sld xmlns:a="http://schemas.openxmlformats.org/drawingml/2006/main" xmlns:r="http://schemas.openxmlformats.org/officeDocument/2006/relationships" xmlns:p="http://schemas.openxmlformats.org/presentationml/2006/main">
-  <p:cSld>
-    <p:spTree>
-      <p:nvGrpSpPr>
-        <p:cNvPr id="1" name=""/>
-        <p:cNvGrpSpPr/>
-        <p:nvPr/>
-      </p:nvGrpSpPr>
-      <p:grpSpPr>
-        <a:xfrm>
-          <a:off x="0" y="0"/>
-          <a:ext cx="0" cy="0"/>
-          <a:chOff x="0" y="0"/>
-          <a:chExt cx="0" cy="0"/>
-        </a:xfrm>
-      </p:grpSpPr>
       <p:grpSp>
         <p:nvGrpSpPr>
           <p:cNvPr id="2" name="Group 1">
@@ -3537,7 +2083,7 @@
 </p:sld>
 </file>
 
-<file path=ppt/slides/slide4.xml><?xml version="1.0" encoding="utf-8"?>
+<file path=ppt/slides/slide2.xml><?xml version="1.0" encoding="utf-8"?>
 <p:sld xmlns:a="http://schemas.openxmlformats.org/drawingml/2006/main" xmlns:r="http://schemas.openxmlformats.org/officeDocument/2006/relationships" xmlns:p="http://schemas.openxmlformats.org/presentationml/2006/main">
   <p:cSld>
     <p:spTree>
@@ -4311,580 +2857,7 @@
 </p:sld>
 </file>
 
-<file path=ppt/slides/slide5.xml><?xml version="1.0" encoding="utf-8"?>
-<p:sld xmlns:a="http://schemas.openxmlformats.org/drawingml/2006/main" xmlns:r="http://schemas.openxmlformats.org/officeDocument/2006/relationships" xmlns:p="http://schemas.openxmlformats.org/presentationml/2006/main">
-  <p:cSld>
-    <p:spTree>
-      <p:nvGrpSpPr>
-        <p:cNvPr id="1" name=""/>
-        <p:cNvGrpSpPr/>
-        <p:nvPr/>
-      </p:nvGrpSpPr>
-      <p:grpSpPr>
-        <a:xfrm>
-          <a:off x="0" y="0"/>
-          <a:ext cx="0" cy="0"/>
-          <a:chOff x="0" y="0"/>
-          <a:chExt cx="0" cy="0"/>
-        </a:xfrm>
-      </p:grpSpPr>
-      <p:sp>
-        <p:nvSpPr>
-          <p:cNvPr id="7" name="TextBox 6">
-            <a:extLst>
-              <a:ext uri="{FF2B5EF4-FFF2-40B4-BE49-F238E27FC236}">
-                <a16:creationId xmlns:a16="http://schemas.microsoft.com/office/drawing/2014/main" id="{72272CE1-E739-FDA7-3DE8-0908A2ED6630}"/>
-              </a:ext>
-            </a:extLst>
-          </p:cNvPr>
-          <p:cNvSpPr txBox="1"/>
-          <p:nvPr/>
-        </p:nvSpPr>
-        <p:spPr>
-          <a:xfrm>
-            <a:off x="1660338" y="563427"/>
-            <a:ext cx="9322189" cy="830997"/>
-          </a:xfrm>
-          <a:prstGeom prst="rect">
-            <a:avLst/>
-          </a:prstGeom>
-          <a:noFill/>
-        </p:spPr>
-        <p:txBody>
-          <a:bodyPr wrap="square" rtlCol="0">
-            <a:spAutoFit/>
-          </a:bodyPr>
-          <a:lstStyle/>
-          <a:p>
-            <a:pPr algn="ctr"/>
-            <a:r>
-              <a:rPr lang="en-GB" sz="2400" dirty="0"/>
-              <a:t>You will see a series of circles in red, green, blue or yellow. Press the button that correspond to the colour of the circle.</a:t>
-            </a:r>
-            <a:endParaRPr lang="en-DK" sz="2400" dirty="0"/>
-          </a:p>
-        </p:txBody>
-      </p:sp>
-      <p:sp>
-        <p:nvSpPr>
-          <p:cNvPr id="2" name="Oval 1">
-            <a:extLst>
-              <a:ext uri="{FF2B5EF4-FFF2-40B4-BE49-F238E27FC236}">
-                <a16:creationId xmlns:a16="http://schemas.microsoft.com/office/drawing/2014/main" id="{BD2D3368-47FB-87FE-CBDB-6ED8857547C7}"/>
-              </a:ext>
-            </a:extLst>
-          </p:cNvPr>
-          <p:cNvSpPr/>
-          <p:nvPr/>
-        </p:nvSpPr>
-        <p:spPr>
-          <a:xfrm>
-            <a:off x="2520521" y="3456743"/>
-            <a:ext cx="895547" cy="857839"/>
-          </a:xfrm>
-          <a:prstGeom prst="ellipse">
-            <a:avLst/>
-          </a:prstGeom>
-          <a:solidFill>
-            <a:srgbClr val="FF0000"/>
-          </a:solidFill>
-        </p:spPr>
-        <p:style>
-          <a:lnRef idx="2">
-            <a:schemeClr val="accent1">
-              <a:shade val="15000"/>
-            </a:schemeClr>
-          </a:lnRef>
-          <a:fillRef idx="1">
-            <a:schemeClr val="accent1"/>
-          </a:fillRef>
-          <a:effectRef idx="0">
-            <a:schemeClr val="accent1"/>
-          </a:effectRef>
-          <a:fontRef idx="minor">
-            <a:schemeClr val="lt1"/>
-          </a:fontRef>
-        </p:style>
-        <p:txBody>
-          <a:bodyPr rtlCol="0" anchor="ctr"/>
-          <a:lstStyle/>
-          <a:p>
-            <a:pPr algn="ctr"/>
-            <a:endParaRPr lang="en-DK" dirty="0">
-              <a:solidFill>
-                <a:schemeClr val="tx1"/>
-              </a:solidFill>
-            </a:endParaRPr>
-          </a:p>
-        </p:txBody>
-      </p:sp>
-      <p:grpSp>
-        <p:nvGrpSpPr>
-          <p:cNvPr id="11" name="Group 10">
-            <a:extLst>
-              <a:ext uri="{FF2B5EF4-FFF2-40B4-BE49-F238E27FC236}">
-                <a16:creationId xmlns:a16="http://schemas.microsoft.com/office/drawing/2014/main" id="{274AC913-30C1-507D-6D0B-2133C42A800D}"/>
-              </a:ext>
-            </a:extLst>
-          </p:cNvPr>
-          <p:cNvGrpSpPr/>
-          <p:nvPr/>
-        </p:nvGrpSpPr>
-        <p:grpSpPr>
-          <a:xfrm>
-            <a:off x="7278051" y="2499338"/>
-            <a:ext cx="3471594" cy="2777275"/>
-            <a:chOff x="6533799" y="2280677"/>
-            <a:chExt cx="3471594" cy="2777275"/>
-          </a:xfrm>
-        </p:grpSpPr>
-        <p:pic>
-          <p:nvPicPr>
-            <p:cNvPr id="5" name="Picture 4" descr="A white rectangular object with blue buttons&#10;&#10;Description automatically generated">
-              <a:extLst>
-                <a:ext uri="{FF2B5EF4-FFF2-40B4-BE49-F238E27FC236}">
-                  <a16:creationId xmlns:a16="http://schemas.microsoft.com/office/drawing/2014/main" id="{57480E33-7C67-C025-8377-1BBF2EE95A12}"/>
-                </a:ext>
-              </a:extLst>
-            </p:cNvPr>
-            <p:cNvPicPr>
-              <a:picLocks noChangeAspect="1"/>
-            </p:cNvPicPr>
-            <p:nvPr/>
-          </p:nvPicPr>
-          <p:blipFill>
-            <a:blip r:embed="rId3">
-              <a:extLst>
-                <a:ext uri="{28A0092B-C50C-407E-A947-70E740481C1C}">
-                  <a14:useLocalDpi xmlns:a14="http://schemas.microsoft.com/office/drawing/2010/main" val="0"/>
-                </a:ext>
-              </a:extLst>
-            </a:blip>
-            <a:stretch>
-              <a:fillRect/>
-            </a:stretch>
-          </p:blipFill>
-          <p:spPr>
-            <a:xfrm>
-              <a:off x="6533799" y="2280677"/>
-              <a:ext cx="3471594" cy="2777275"/>
-            </a:xfrm>
-            <a:prstGeom prst="rect">
-              <a:avLst/>
-            </a:prstGeom>
-          </p:spPr>
-        </p:pic>
-        <p:sp>
-          <p:nvSpPr>
-            <p:cNvPr id="3" name="Oval 2">
-              <a:extLst>
-                <a:ext uri="{FF2B5EF4-FFF2-40B4-BE49-F238E27FC236}">
-                  <a16:creationId xmlns:a16="http://schemas.microsoft.com/office/drawing/2014/main" id="{85609228-FA48-0048-4B3B-C470B4A2739B}"/>
-                </a:ext>
-              </a:extLst>
-            </p:cNvPr>
-            <p:cNvSpPr/>
-            <p:nvPr/>
-          </p:nvSpPr>
-          <p:spPr>
-            <a:xfrm>
-              <a:off x="7966311" y="2591991"/>
-              <a:ext cx="540000" cy="540000"/>
-            </a:xfrm>
-            <a:prstGeom prst="ellipse">
-              <a:avLst/>
-            </a:prstGeom>
-            <a:solidFill>
-              <a:srgbClr val="FF0000"/>
-            </a:solidFill>
-          </p:spPr>
-          <p:style>
-            <a:lnRef idx="2">
-              <a:schemeClr val="accent1">
-                <a:shade val="15000"/>
-              </a:schemeClr>
-            </a:lnRef>
-            <a:fillRef idx="1">
-              <a:schemeClr val="accent1"/>
-            </a:fillRef>
-            <a:effectRef idx="0">
-              <a:schemeClr val="accent1"/>
-            </a:effectRef>
-            <a:fontRef idx="minor">
-              <a:schemeClr val="lt1"/>
-            </a:fontRef>
-          </p:style>
-          <p:txBody>
-            <a:bodyPr rtlCol="0" anchor="ctr"/>
-            <a:lstStyle/>
-            <a:p>
-              <a:pPr algn="ctr"/>
-              <a:endParaRPr lang="en-DK" dirty="0">
-                <a:solidFill>
-                  <a:schemeClr val="tx1"/>
-                </a:solidFill>
-              </a:endParaRPr>
-            </a:p>
-          </p:txBody>
-        </p:sp>
-        <p:sp>
-          <p:nvSpPr>
-            <p:cNvPr id="8" name="Oval 7">
-              <a:extLst>
-                <a:ext uri="{FF2B5EF4-FFF2-40B4-BE49-F238E27FC236}">
-                  <a16:creationId xmlns:a16="http://schemas.microsoft.com/office/drawing/2014/main" id="{1A077E92-C2DB-66B6-BE4F-3AE5ADF39781}"/>
-                </a:ext>
-              </a:extLst>
-            </p:cNvPr>
-            <p:cNvSpPr/>
-            <p:nvPr/>
-          </p:nvSpPr>
-          <p:spPr>
-            <a:xfrm>
-              <a:off x="9020883" y="3399314"/>
-              <a:ext cx="540000" cy="540000"/>
-            </a:xfrm>
-            <a:prstGeom prst="ellipse">
-              <a:avLst/>
-            </a:prstGeom>
-            <a:solidFill>
-              <a:srgbClr val="00B050"/>
-            </a:solidFill>
-          </p:spPr>
-          <p:style>
-            <a:lnRef idx="2">
-              <a:schemeClr val="accent1">
-                <a:shade val="15000"/>
-              </a:schemeClr>
-            </a:lnRef>
-            <a:fillRef idx="1">
-              <a:schemeClr val="accent1"/>
-            </a:fillRef>
-            <a:effectRef idx="0">
-              <a:schemeClr val="accent1"/>
-            </a:effectRef>
-            <a:fontRef idx="minor">
-              <a:schemeClr val="lt1"/>
-            </a:fontRef>
-          </p:style>
-          <p:txBody>
-            <a:bodyPr rtlCol="0" anchor="ctr"/>
-            <a:lstStyle/>
-            <a:p>
-              <a:pPr algn="ctr"/>
-              <a:endParaRPr lang="en-DK" dirty="0">
-                <a:solidFill>
-                  <a:schemeClr val="tx1"/>
-                </a:solidFill>
-              </a:endParaRPr>
-            </a:p>
-          </p:txBody>
-        </p:sp>
-        <p:sp>
-          <p:nvSpPr>
-            <p:cNvPr id="9" name="Oval 8">
-              <a:extLst>
-                <a:ext uri="{FF2B5EF4-FFF2-40B4-BE49-F238E27FC236}">
-                  <a16:creationId xmlns:a16="http://schemas.microsoft.com/office/drawing/2014/main" id="{C3EE3612-A434-5D49-786C-189B8865D17B}"/>
-                </a:ext>
-              </a:extLst>
-            </p:cNvPr>
-            <p:cNvSpPr/>
-            <p:nvPr/>
-          </p:nvSpPr>
-          <p:spPr>
-            <a:xfrm>
-              <a:off x="7966311" y="4243902"/>
-              <a:ext cx="540000" cy="540000"/>
-            </a:xfrm>
-            <a:prstGeom prst="ellipse">
-              <a:avLst/>
-            </a:prstGeom>
-          </p:spPr>
-          <p:style>
-            <a:lnRef idx="2">
-              <a:schemeClr val="accent1">
-                <a:shade val="15000"/>
-              </a:schemeClr>
-            </a:lnRef>
-            <a:fillRef idx="1">
-              <a:schemeClr val="accent1"/>
-            </a:fillRef>
-            <a:effectRef idx="0">
-              <a:schemeClr val="accent1"/>
-            </a:effectRef>
-            <a:fontRef idx="minor">
-              <a:schemeClr val="lt1"/>
-            </a:fontRef>
-          </p:style>
-          <p:txBody>
-            <a:bodyPr rtlCol="0" anchor="ctr"/>
-            <a:lstStyle/>
-            <a:p>
-              <a:pPr algn="ctr"/>
-              <a:endParaRPr lang="en-DK" dirty="0">
-                <a:solidFill>
-                  <a:schemeClr val="tx1"/>
-                </a:solidFill>
-              </a:endParaRPr>
-            </a:p>
-          </p:txBody>
-        </p:sp>
-        <p:sp>
-          <p:nvSpPr>
-            <p:cNvPr id="10" name="Oval 9">
-              <a:extLst>
-                <a:ext uri="{FF2B5EF4-FFF2-40B4-BE49-F238E27FC236}">
-                  <a16:creationId xmlns:a16="http://schemas.microsoft.com/office/drawing/2014/main" id="{92EB3F72-8DEE-AB6D-1209-934BDB9E9B00}"/>
-                </a:ext>
-              </a:extLst>
-            </p:cNvPr>
-            <p:cNvSpPr/>
-            <p:nvPr/>
-          </p:nvSpPr>
-          <p:spPr>
-            <a:xfrm>
-              <a:off x="6846142" y="3399314"/>
-              <a:ext cx="540000" cy="540000"/>
-            </a:xfrm>
-            <a:prstGeom prst="ellipse">
-              <a:avLst/>
-            </a:prstGeom>
-            <a:solidFill>
-              <a:srgbClr val="FFFF00"/>
-            </a:solidFill>
-          </p:spPr>
-          <p:style>
-            <a:lnRef idx="2">
-              <a:schemeClr val="accent1">
-                <a:shade val="15000"/>
-              </a:schemeClr>
-            </a:lnRef>
-            <a:fillRef idx="1">
-              <a:schemeClr val="accent1"/>
-            </a:fillRef>
-            <a:effectRef idx="0">
-              <a:schemeClr val="accent1"/>
-            </a:effectRef>
-            <a:fontRef idx="minor">
-              <a:schemeClr val="lt1"/>
-            </a:fontRef>
-          </p:style>
-          <p:txBody>
-            <a:bodyPr rtlCol="0" anchor="ctr"/>
-            <a:lstStyle/>
-            <a:p>
-              <a:pPr algn="ctr"/>
-              <a:endParaRPr lang="en-DK" dirty="0">
-                <a:solidFill>
-                  <a:schemeClr val="bg1"/>
-                </a:solidFill>
-              </a:endParaRPr>
-            </a:p>
-          </p:txBody>
-        </p:sp>
-      </p:grpSp>
-      <p:sp>
-        <p:nvSpPr>
-          <p:cNvPr id="6" name="Rectangle 5">
-            <a:extLst>
-              <a:ext uri="{FF2B5EF4-FFF2-40B4-BE49-F238E27FC236}">
-                <a16:creationId xmlns:a16="http://schemas.microsoft.com/office/drawing/2014/main" id="{5D665CC8-E90C-65A8-B776-5346BD8EA89A}"/>
-              </a:ext>
-            </a:extLst>
-          </p:cNvPr>
-          <p:cNvSpPr/>
-          <p:nvPr/>
-        </p:nvSpPr>
-        <p:spPr>
-          <a:xfrm>
-            <a:off x="589530" y="2280677"/>
-            <a:ext cx="4757530" cy="3209972"/>
-          </a:xfrm>
-          <a:prstGeom prst="rect">
-            <a:avLst/>
-          </a:prstGeom>
-          <a:noFill/>
-          <a:ln w="19050">
-            <a:solidFill>
-              <a:schemeClr val="tx1"/>
-            </a:solidFill>
-          </a:ln>
-        </p:spPr>
-        <p:style>
-          <a:lnRef idx="2">
-            <a:schemeClr val="accent1">
-              <a:shade val="15000"/>
-            </a:schemeClr>
-          </a:lnRef>
-          <a:fillRef idx="1">
-            <a:schemeClr val="accent1"/>
-          </a:fillRef>
-          <a:effectRef idx="0">
-            <a:schemeClr val="accent1"/>
-          </a:effectRef>
-          <a:fontRef idx="minor">
-            <a:schemeClr val="lt1"/>
-          </a:fontRef>
-        </p:style>
-        <p:txBody>
-          <a:bodyPr rtlCol="0" anchor="ctr"/>
-          <a:lstStyle/>
-          <a:p>
-            <a:pPr algn="ctr"/>
-            <a:endParaRPr lang="en-DK"/>
-          </a:p>
-        </p:txBody>
-      </p:sp>
-      <p:sp>
-        <p:nvSpPr>
-          <p:cNvPr id="12" name="TextBox 11">
-            <a:extLst>
-              <a:ext uri="{FF2B5EF4-FFF2-40B4-BE49-F238E27FC236}">
-                <a16:creationId xmlns:a16="http://schemas.microsoft.com/office/drawing/2014/main" id="{0F866BCD-13EE-9EF1-3D07-14EEDEC94D7B}"/>
-              </a:ext>
-            </a:extLst>
-          </p:cNvPr>
-          <p:cNvSpPr txBox="1"/>
-          <p:nvPr/>
-        </p:nvSpPr>
-        <p:spPr>
-          <a:xfrm>
-            <a:off x="6895484" y="1853006"/>
-            <a:ext cx="4170157" cy="646331"/>
-          </a:xfrm>
-          <a:prstGeom prst="rect">
-            <a:avLst/>
-          </a:prstGeom>
-          <a:noFill/>
-        </p:spPr>
-        <p:txBody>
-          <a:bodyPr wrap="square" rtlCol="0">
-            <a:spAutoFit/>
-          </a:bodyPr>
-          <a:lstStyle/>
-          <a:p>
-            <a:r>
-              <a:rPr lang="en-GB" dirty="0"/>
-              <a:t>In this case press the RED button, because the circle is red.</a:t>
-            </a:r>
-            <a:endParaRPr lang="en-DK" dirty="0"/>
-          </a:p>
-        </p:txBody>
-      </p:sp>
-      <p:cxnSp>
-        <p:nvCxnSpPr>
-          <p:cNvPr id="14" name="Straight Arrow Connector 13">
-            <a:extLst>
-              <a:ext uri="{FF2B5EF4-FFF2-40B4-BE49-F238E27FC236}">
-                <a16:creationId xmlns:a16="http://schemas.microsoft.com/office/drawing/2014/main" id="{04189940-EC9A-C630-696D-E89126282625}"/>
-              </a:ext>
-            </a:extLst>
-          </p:cNvPr>
-          <p:cNvCxnSpPr>
-            <a:stCxn id="12" idx="2"/>
-            <a:endCxn id="3" idx="0"/>
-          </p:cNvCxnSpPr>
-          <p:nvPr/>
-        </p:nvCxnSpPr>
-        <p:spPr>
-          <a:xfrm>
-            <a:off x="8980563" y="2499337"/>
-            <a:ext cx="0" cy="311315"/>
-          </a:xfrm>
-          <a:prstGeom prst="straightConnector1">
-            <a:avLst/>
-          </a:prstGeom>
-          <a:ln w="38100">
-            <a:solidFill>
-              <a:schemeClr val="tx1"/>
-            </a:solidFill>
-            <a:tailEnd type="triangle"/>
-          </a:ln>
-        </p:spPr>
-        <p:style>
-          <a:lnRef idx="1">
-            <a:schemeClr val="accent1"/>
-          </a:lnRef>
-          <a:fillRef idx="0">
-            <a:schemeClr val="accent1"/>
-          </a:fillRef>
-          <a:effectRef idx="0">
-            <a:schemeClr val="accent1"/>
-          </a:effectRef>
-          <a:fontRef idx="minor">
-            <a:schemeClr val="tx1"/>
-          </a:fontRef>
-        </p:style>
-      </p:cxnSp>
-      <p:sp>
-        <p:nvSpPr>
-          <p:cNvPr id="15" name="Arrow: Right 14">
-            <a:extLst>
-              <a:ext uri="{FF2B5EF4-FFF2-40B4-BE49-F238E27FC236}">
-                <a16:creationId xmlns:a16="http://schemas.microsoft.com/office/drawing/2014/main" id="{148741A0-C0A6-E6D1-2CC9-57459D2FBEA5}"/>
-              </a:ext>
-            </a:extLst>
-          </p:cNvPr>
-          <p:cNvSpPr/>
-          <p:nvPr/>
-        </p:nvSpPr>
-        <p:spPr>
-          <a:xfrm>
-            <a:off x="5945645" y="3456742"/>
-            <a:ext cx="887896" cy="857839"/>
-          </a:xfrm>
-          <a:prstGeom prst="rightArrow">
-            <a:avLst/>
-          </a:prstGeom>
-          <a:solidFill>
-            <a:schemeClr val="tx1"/>
-          </a:solidFill>
-          <a:ln>
-            <a:solidFill>
-              <a:schemeClr val="tx1"/>
-            </a:solidFill>
-          </a:ln>
-        </p:spPr>
-        <p:style>
-          <a:lnRef idx="2">
-            <a:schemeClr val="accent1">
-              <a:shade val="15000"/>
-            </a:schemeClr>
-          </a:lnRef>
-          <a:fillRef idx="1">
-            <a:schemeClr val="accent1"/>
-          </a:fillRef>
-          <a:effectRef idx="0">
-            <a:schemeClr val="accent1"/>
-          </a:effectRef>
-          <a:fontRef idx="minor">
-            <a:schemeClr val="lt1"/>
-          </a:fontRef>
-        </p:style>
-        <p:txBody>
-          <a:bodyPr rtlCol="0" anchor="ctr"/>
-          <a:lstStyle/>
-          <a:p>
-            <a:pPr algn="ctr"/>
-            <a:endParaRPr lang="en-DK"/>
-          </a:p>
-        </p:txBody>
-      </p:sp>
-    </p:spTree>
-    <p:extLst>
-      <p:ext uri="{BB962C8B-B14F-4D97-AF65-F5344CB8AC3E}">
-        <p14:creationId xmlns:p14="http://schemas.microsoft.com/office/powerpoint/2010/main" val="3886354962"/>
-      </p:ext>
-    </p:extLst>
-  </p:cSld>
-  <p:clrMapOvr>
-    <a:masterClrMapping/>
-  </p:clrMapOvr>
-</p:sld>
-</file>
-
-<file path=ppt/slides/slide6.xml><?xml version="1.0" encoding="utf-8"?>
+<file path=ppt/slides/slide3.xml><?xml version="1.0" encoding="utf-8"?>
 <p:sld xmlns:a="http://schemas.openxmlformats.org/drawingml/2006/main" xmlns:r="http://schemas.openxmlformats.org/officeDocument/2006/relationships" xmlns:p="http://schemas.openxmlformats.org/presentationml/2006/main">
   <p:cSld>
     <p:spTree>
@@ -5233,570 +3206,6 @@
         </p:nvSpPr>
         <p:spPr>
           <a:xfrm>
-            <a:off x="6895484" y="1853006"/>
-            <a:ext cx="4170157" cy="646331"/>
-          </a:xfrm>
-          <a:prstGeom prst="rect">
-            <a:avLst/>
-          </a:prstGeom>
-          <a:noFill/>
-        </p:spPr>
-        <p:txBody>
-          <a:bodyPr wrap="square" rtlCol="0">
-            <a:spAutoFit/>
-          </a:bodyPr>
-          <a:lstStyle/>
-          <a:p>
-            <a:r>
-              <a:rPr lang="en-GB" dirty="0"/>
-              <a:t>In this case press the RED button, because the word is written in red.</a:t>
-            </a:r>
-            <a:endParaRPr lang="en-DK" dirty="0"/>
-          </a:p>
-        </p:txBody>
-      </p:sp>
-      <p:cxnSp>
-        <p:nvCxnSpPr>
-          <p:cNvPr id="14" name="Straight Arrow Connector 13">
-            <a:extLst>
-              <a:ext uri="{FF2B5EF4-FFF2-40B4-BE49-F238E27FC236}">
-                <a16:creationId xmlns:a16="http://schemas.microsoft.com/office/drawing/2014/main" id="{04189940-EC9A-C630-696D-E89126282625}"/>
-              </a:ext>
-            </a:extLst>
-          </p:cNvPr>
-          <p:cNvCxnSpPr>
-            <a:stCxn id="12" idx="2"/>
-            <a:endCxn id="3" idx="0"/>
-          </p:cNvCxnSpPr>
-          <p:nvPr/>
-        </p:nvCxnSpPr>
-        <p:spPr>
-          <a:xfrm>
-            <a:off x="8980563" y="2499337"/>
-            <a:ext cx="0" cy="311315"/>
-          </a:xfrm>
-          <a:prstGeom prst="straightConnector1">
-            <a:avLst/>
-          </a:prstGeom>
-          <a:ln w="38100">
-            <a:solidFill>
-              <a:schemeClr val="tx1"/>
-            </a:solidFill>
-            <a:tailEnd type="triangle"/>
-          </a:ln>
-        </p:spPr>
-        <p:style>
-          <a:lnRef idx="1">
-            <a:schemeClr val="accent1"/>
-          </a:lnRef>
-          <a:fillRef idx="0">
-            <a:schemeClr val="accent1"/>
-          </a:fillRef>
-          <a:effectRef idx="0">
-            <a:schemeClr val="accent1"/>
-          </a:effectRef>
-          <a:fontRef idx="minor">
-            <a:schemeClr val="tx1"/>
-          </a:fontRef>
-        </p:style>
-      </p:cxnSp>
-      <p:sp>
-        <p:nvSpPr>
-          <p:cNvPr id="15" name="Arrow: Right 14">
-            <a:extLst>
-              <a:ext uri="{FF2B5EF4-FFF2-40B4-BE49-F238E27FC236}">
-                <a16:creationId xmlns:a16="http://schemas.microsoft.com/office/drawing/2014/main" id="{148741A0-C0A6-E6D1-2CC9-57459D2FBEA5}"/>
-              </a:ext>
-            </a:extLst>
-          </p:cNvPr>
-          <p:cNvSpPr/>
-          <p:nvPr/>
-        </p:nvSpPr>
-        <p:spPr>
-          <a:xfrm>
-            <a:off x="5945645" y="3456742"/>
-            <a:ext cx="887896" cy="857839"/>
-          </a:xfrm>
-          <a:prstGeom prst="rightArrow">
-            <a:avLst/>
-          </a:prstGeom>
-          <a:solidFill>
-            <a:schemeClr val="tx1"/>
-          </a:solidFill>
-          <a:ln>
-            <a:solidFill>
-              <a:schemeClr val="tx1"/>
-            </a:solidFill>
-          </a:ln>
-        </p:spPr>
-        <p:style>
-          <a:lnRef idx="2">
-            <a:schemeClr val="accent1">
-              <a:shade val="15000"/>
-            </a:schemeClr>
-          </a:lnRef>
-          <a:fillRef idx="1">
-            <a:schemeClr val="accent1"/>
-          </a:fillRef>
-          <a:effectRef idx="0">
-            <a:schemeClr val="accent1"/>
-          </a:effectRef>
-          <a:fontRef idx="minor">
-            <a:schemeClr val="lt1"/>
-          </a:fontRef>
-        </p:style>
-        <p:txBody>
-          <a:bodyPr rtlCol="0" anchor="ctr"/>
-          <a:lstStyle/>
-          <a:p>
-            <a:pPr algn="ctr"/>
-            <a:endParaRPr lang="en-DK"/>
-          </a:p>
-        </p:txBody>
-      </p:sp>
-      <p:sp>
-        <p:nvSpPr>
-          <p:cNvPr id="4" name="TextBox 3">
-            <a:extLst>
-              <a:ext uri="{FF2B5EF4-FFF2-40B4-BE49-F238E27FC236}">
-                <a16:creationId xmlns:a16="http://schemas.microsoft.com/office/drawing/2014/main" id="{9BC7286E-540A-E2B3-D8AD-727E82267F80}"/>
-              </a:ext>
-            </a:extLst>
-          </p:cNvPr>
-          <p:cNvSpPr txBox="1"/>
-          <p:nvPr/>
-        </p:nvSpPr>
-        <p:spPr>
-          <a:xfrm>
-            <a:off x="1660339" y="563427"/>
-            <a:ext cx="9134272" cy="830997"/>
-          </a:xfrm>
-          <a:prstGeom prst="rect">
-            <a:avLst/>
-          </a:prstGeom>
-          <a:noFill/>
-        </p:spPr>
-        <p:txBody>
-          <a:bodyPr wrap="square" rtlCol="0">
-            <a:spAutoFit/>
-          </a:bodyPr>
-          <a:lstStyle/>
-          <a:p>
-            <a:pPr algn="ctr"/>
-            <a:r>
-              <a:rPr lang="en-GB" sz="2400" dirty="0"/>
-              <a:t>You will see a series of words written in red, green, blue or yellow. Press the button that correspond to the colour the word is written in.</a:t>
-            </a:r>
-            <a:endParaRPr lang="en-DK" sz="2400" dirty="0"/>
-          </a:p>
-        </p:txBody>
-      </p:sp>
-      <p:sp>
-        <p:nvSpPr>
-          <p:cNvPr id="13" name="TextBox 12">
-            <a:extLst>
-              <a:ext uri="{FF2B5EF4-FFF2-40B4-BE49-F238E27FC236}">
-                <a16:creationId xmlns:a16="http://schemas.microsoft.com/office/drawing/2014/main" id="{38969B68-7DE4-4BA1-511B-75BBBF64D129}"/>
-              </a:ext>
-            </a:extLst>
-          </p:cNvPr>
-          <p:cNvSpPr txBox="1"/>
-          <p:nvPr/>
-        </p:nvSpPr>
-        <p:spPr>
-          <a:xfrm>
-            <a:off x="2158618" y="3531718"/>
-            <a:ext cx="1619354" cy="707886"/>
-          </a:xfrm>
-          <a:prstGeom prst="rect">
-            <a:avLst/>
-          </a:prstGeom>
-          <a:noFill/>
-        </p:spPr>
-        <p:txBody>
-          <a:bodyPr wrap="none" rtlCol="0">
-            <a:spAutoFit/>
-          </a:bodyPr>
-          <a:lstStyle/>
-          <a:p>
-            <a:r>
-              <a:rPr lang="en-GB" sz="4000" dirty="0">
-                <a:solidFill>
-                  <a:srgbClr val="FF0000"/>
-                </a:solidFill>
-              </a:rPr>
-              <a:t>GREEN</a:t>
-            </a:r>
-            <a:endParaRPr lang="en-DK" sz="4000" dirty="0">
-              <a:solidFill>
-                <a:srgbClr val="FF0000"/>
-              </a:solidFill>
-            </a:endParaRPr>
-          </a:p>
-        </p:txBody>
-      </p:sp>
-    </p:spTree>
-    <p:extLst>
-      <p:ext uri="{BB962C8B-B14F-4D97-AF65-F5344CB8AC3E}">
-        <p14:creationId xmlns:p14="http://schemas.microsoft.com/office/powerpoint/2010/main" val="130121127"/>
-      </p:ext>
-    </p:extLst>
-  </p:cSld>
-  <p:clrMapOvr>
-    <a:masterClrMapping/>
-  </p:clrMapOvr>
-</p:sld>
-</file>
-
-<file path=ppt/slides/slide7.xml><?xml version="1.0" encoding="utf-8"?>
-<p:sld xmlns:a="http://schemas.openxmlformats.org/drawingml/2006/main" xmlns:r="http://schemas.openxmlformats.org/officeDocument/2006/relationships" xmlns:p="http://schemas.openxmlformats.org/presentationml/2006/main">
-  <p:cSld>
-    <p:spTree>
-      <p:nvGrpSpPr>
-        <p:cNvPr id="1" name=""/>
-        <p:cNvGrpSpPr/>
-        <p:nvPr/>
-      </p:nvGrpSpPr>
-      <p:grpSpPr>
-        <a:xfrm>
-          <a:off x="0" y="0"/>
-          <a:ext cx="0" cy="0"/>
-          <a:chOff x="0" y="0"/>
-          <a:chExt cx="0" cy="0"/>
-        </a:xfrm>
-      </p:grpSpPr>
-      <p:grpSp>
-        <p:nvGrpSpPr>
-          <p:cNvPr id="11" name="Group 10">
-            <a:extLst>
-              <a:ext uri="{FF2B5EF4-FFF2-40B4-BE49-F238E27FC236}">
-                <a16:creationId xmlns:a16="http://schemas.microsoft.com/office/drawing/2014/main" id="{274AC913-30C1-507D-6D0B-2133C42A800D}"/>
-              </a:ext>
-            </a:extLst>
-          </p:cNvPr>
-          <p:cNvGrpSpPr/>
-          <p:nvPr/>
-        </p:nvGrpSpPr>
-        <p:grpSpPr>
-          <a:xfrm>
-            <a:off x="7278051" y="2499338"/>
-            <a:ext cx="3471594" cy="2777275"/>
-            <a:chOff x="6533799" y="2280677"/>
-            <a:chExt cx="3471594" cy="2777275"/>
-          </a:xfrm>
-        </p:grpSpPr>
-        <p:pic>
-          <p:nvPicPr>
-            <p:cNvPr id="5" name="Picture 4" descr="A white rectangular object with blue buttons&#10;&#10;Description automatically generated">
-              <a:extLst>
-                <a:ext uri="{FF2B5EF4-FFF2-40B4-BE49-F238E27FC236}">
-                  <a16:creationId xmlns:a16="http://schemas.microsoft.com/office/drawing/2014/main" id="{57480E33-7C67-C025-8377-1BBF2EE95A12}"/>
-                </a:ext>
-              </a:extLst>
-            </p:cNvPr>
-            <p:cNvPicPr>
-              <a:picLocks noChangeAspect="1"/>
-            </p:cNvPicPr>
-            <p:nvPr/>
-          </p:nvPicPr>
-          <p:blipFill>
-            <a:blip r:embed="rId3">
-              <a:extLst>
-                <a:ext uri="{28A0092B-C50C-407E-A947-70E740481C1C}">
-                  <a14:useLocalDpi xmlns:a14="http://schemas.microsoft.com/office/drawing/2010/main" val="0"/>
-                </a:ext>
-              </a:extLst>
-            </a:blip>
-            <a:stretch>
-              <a:fillRect/>
-            </a:stretch>
-          </p:blipFill>
-          <p:spPr>
-            <a:xfrm>
-              <a:off x="6533799" y="2280677"/>
-              <a:ext cx="3471594" cy="2777275"/>
-            </a:xfrm>
-            <a:prstGeom prst="rect">
-              <a:avLst/>
-            </a:prstGeom>
-          </p:spPr>
-        </p:pic>
-        <p:sp>
-          <p:nvSpPr>
-            <p:cNvPr id="3" name="Oval 2">
-              <a:extLst>
-                <a:ext uri="{FF2B5EF4-FFF2-40B4-BE49-F238E27FC236}">
-                  <a16:creationId xmlns:a16="http://schemas.microsoft.com/office/drawing/2014/main" id="{85609228-FA48-0048-4B3B-C470B4A2739B}"/>
-                </a:ext>
-              </a:extLst>
-            </p:cNvPr>
-            <p:cNvSpPr/>
-            <p:nvPr/>
-          </p:nvSpPr>
-          <p:spPr>
-            <a:xfrm>
-              <a:off x="7966311" y="2591991"/>
-              <a:ext cx="540000" cy="540000"/>
-            </a:xfrm>
-            <a:prstGeom prst="ellipse">
-              <a:avLst/>
-            </a:prstGeom>
-            <a:solidFill>
-              <a:srgbClr val="FF0000"/>
-            </a:solidFill>
-          </p:spPr>
-          <p:style>
-            <a:lnRef idx="2">
-              <a:schemeClr val="accent1">
-                <a:shade val="15000"/>
-              </a:schemeClr>
-            </a:lnRef>
-            <a:fillRef idx="1">
-              <a:schemeClr val="accent1"/>
-            </a:fillRef>
-            <a:effectRef idx="0">
-              <a:schemeClr val="accent1"/>
-            </a:effectRef>
-            <a:fontRef idx="minor">
-              <a:schemeClr val="lt1"/>
-            </a:fontRef>
-          </p:style>
-          <p:txBody>
-            <a:bodyPr rtlCol="0" anchor="ctr"/>
-            <a:lstStyle/>
-            <a:p>
-              <a:pPr algn="ctr"/>
-              <a:endParaRPr lang="en-DK" dirty="0">
-                <a:solidFill>
-                  <a:schemeClr val="tx1"/>
-                </a:solidFill>
-              </a:endParaRPr>
-            </a:p>
-          </p:txBody>
-        </p:sp>
-        <p:sp>
-          <p:nvSpPr>
-            <p:cNvPr id="8" name="Oval 7">
-              <a:extLst>
-                <a:ext uri="{FF2B5EF4-FFF2-40B4-BE49-F238E27FC236}">
-                  <a16:creationId xmlns:a16="http://schemas.microsoft.com/office/drawing/2014/main" id="{1A077E92-C2DB-66B6-BE4F-3AE5ADF39781}"/>
-                </a:ext>
-              </a:extLst>
-            </p:cNvPr>
-            <p:cNvSpPr/>
-            <p:nvPr/>
-          </p:nvSpPr>
-          <p:spPr>
-            <a:xfrm>
-              <a:off x="9020883" y="3399314"/>
-              <a:ext cx="540000" cy="540000"/>
-            </a:xfrm>
-            <a:prstGeom prst="ellipse">
-              <a:avLst/>
-            </a:prstGeom>
-            <a:solidFill>
-              <a:srgbClr val="00B050"/>
-            </a:solidFill>
-          </p:spPr>
-          <p:style>
-            <a:lnRef idx="2">
-              <a:schemeClr val="accent1">
-                <a:shade val="15000"/>
-              </a:schemeClr>
-            </a:lnRef>
-            <a:fillRef idx="1">
-              <a:schemeClr val="accent1"/>
-            </a:fillRef>
-            <a:effectRef idx="0">
-              <a:schemeClr val="accent1"/>
-            </a:effectRef>
-            <a:fontRef idx="minor">
-              <a:schemeClr val="lt1"/>
-            </a:fontRef>
-          </p:style>
-          <p:txBody>
-            <a:bodyPr rtlCol="0" anchor="ctr"/>
-            <a:lstStyle/>
-            <a:p>
-              <a:pPr algn="ctr"/>
-              <a:endParaRPr lang="en-DK" dirty="0">
-                <a:solidFill>
-                  <a:schemeClr val="tx1"/>
-                </a:solidFill>
-              </a:endParaRPr>
-            </a:p>
-          </p:txBody>
-        </p:sp>
-        <p:sp>
-          <p:nvSpPr>
-            <p:cNvPr id="9" name="Oval 8">
-              <a:extLst>
-                <a:ext uri="{FF2B5EF4-FFF2-40B4-BE49-F238E27FC236}">
-                  <a16:creationId xmlns:a16="http://schemas.microsoft.com/office/drawing/2014/main" id="{C3EE3612-A434-5D49-786C-189B8865D17B}"/>
-                </a:ext>
-              </a:extLst>
-            </p:cNvPr>
-            <p:cNvSpPr/>
-            <p:nvPr/>
-          </p:nvSpPr>
-          <p:spPr>
-            <a:xfrm>
-              <a:off x="7966311" y="4243902"/>
-              <a:ext cx="540000" cy="540000"/>
-            </a:xfrm>
-            <a:prstGeom prst="ellipse">
-              <a:avLst/>
-            </a:prstGeom>
-          </p:spPr>
-          <p:style>
-            <a:lnRef idx="2">
-              <a:schemeClr val="accent1">
-                <a:shade val="15000"/>
-              </a:schemeClr>
-            </a:lnRef>
-            <a:fillRef idx="1">
-              <a:schemeClr val="accent1"/>
-            </a:fillRef>
-            <a:effectRef idx="0">
-              <a:schemeClr val="accent1"/>
-            </a:effectRef>
-            <a:fontRef idx="minor">
-              <a:schemeClr val="lt1"/>
-            </a:fontRef>
-          </p:style>
-          <p:txBody>
-            <a:bodyPr rtlCol="0" anchor="ctr"/>
-            <a:lstStyle/>
-            <a:p>
-              <a:pPr algn="ctr"/>
-              <a:endParaRPr lang="en-DK" dirty="0">
-                <a:solidFill>
-                  <a:schemeClr val="tx1"/>
-                </a:solidFill>
-              </a:endParaRPr>
-            </a:p>
-          </p:txBody>
-        </p:sp>
-        <p:sp>
-          <p:nvSpPr>
-            <p:cNvPr id="10" name="Oval 9">
-              <a:extLst>
-                <a:ext uri="{FF2B5EF4-FFF2-40B4-BE49-F238E27FC236}">
-                  <a16:creationId xmlns:a16="http://schemas.microsoft.com/office/drawing/2014/main" id="{92EB3F72-8DEE-AB6D-1209-934BDB9E9B00}"/>
-                </a:ext>
-              </a:extLst>
-            </p:cNvPr>
-            <p:cNvSpPr/>
-            <p:nvPr/>
-          </p:nvSpPr>
-          <p:spPr>
-            <a:xfrm>
-              <a:off x="6846142" y="3399314"/>
-              <a:ext cx="540000" cy="540000"/>
-            </a:xfrm>
-            <a:prstGeom prst="ellipse">
-              <a:avLst/>
-            </a:prstGeom>
-            <a:solidFill>
-              <a:srgbClr val="FFFF00"/>
-            </a:solidFill>
-          </p:spPr>
-          <p:style>
-            <a:lnRef idx="2">
-              <a:schemeClr val="accent1">
-                <a:shade val="15000"/>
-              </a:schemeClr>
-            </a:lnRef>
-            <a:fillRef idx="1">
-              <a:schemeClr val="accent1"/>
-            </a:fillRef>
-            <a:effectRef idx="0">
-              <a:schemeClr val="accent1"/>
-            </a:effectRef>
-            <a:fontRef idx="minor">
-              <a:schemeClr val="lt1"/>
-            </a:fontRef>
-          </p:style>
-          <p:txBody>
-            <a:bodyPr rtlCol="0" anchor="ctr"/>
-            <a:lstStyle/>
-            <a:p>
-              <a:pPr algn="ctr"/>
-              <a:endParaRPr lang="en-DK" dirty="0">
-                <a:solidFill>
-                  <a:schemeClr val="bg1"/>
-                </a:solidFill>
-              </a:endParaRPr>
-            </a:p>
-          </p:txBody>
-        </p:sp>
-      </p:grpSp>
-      <p:sp>
-        <p:nvSpPr>
-          <p:cNvPr id="6" name="Rectangle 5">
-            <a:extLst>
-              <a:ext uri="{FF2B5EF4-FFF2-40B4-BE49-F238E27FC236}">
-                <a16:creationId xmlns:a16="http://schemas.microsoft.com/office/drawing/2014/main" id="{5D665CC8-E90C-65A8-B776-5346BD8EA89A}"/>
-              </a:ext>
-            </a:extLst>
-          </p:cNvPr>
-          <p:cNvSpPr/>
-          <p:nvPr/>
-        </p:nvSpPr>
-        <p:spPr>
-          <a:xfrm>
-            <a:off x="589530" y="2280677"/>
-            <a:ext cx="4757530" cy="3209972"/>
-          </a:xfrm>
-          <a:prstGeom prst="rect">
-            <a:avLst/>
-          </a:prstGeom>
-          <a:noFill/>
-          <a:ln w="19050">
-            <a:solidFill>
-              <a:schemeClr val="tx1"/>
-            </a:solidFill>
-          </a:ln>
-        </p:spPr>
-        <p:style>
-          <a:lnRef idx="2">
-            <a:schemeClr val="accent1">
-              <a:shade val="15000"/>
-            </a:schemeClr>
-          </a:lnRef>
-          <a:fillRef idx="1">
-            <a:schemeClr val="accent1"/>
-          </a:fillRef>
-          <a:effectRef idx="0">
-            <a:schemeClr val="accent1"/>
-          </a:effectRef>
-          <a:fontRef idx="minor">
-            <a:schemeClr val="lt1"/>
-          </a:fontRef>
-        </p:style>
-        <p:txBody>
-          <a:bodyPr rtlCol="0" anchor="ctr"/>
-          <a:lstStyle/>
-          <a:p>
-            <a:pPr algn="ctr"/>
-            <a:endParaRPr lang="en-DK"/>
-          </a:p>
-        </p:txBody>
-      </p:sp>
-      <p:sp>
-        <p:nvSpPr>
-          <p:cNvPr id="12" name="TextBox 11">
-            <a:extLst>
-              <a:ext uri="{FF2B5EF4-FFF2-40B4-BE49-F238E27FC236}">
-                <a16:creationId xmlns:a16="http://schemas.microsoft.com/office/drawing/2014/main" id="{0F866BCD-13EE-9EF1-3D07-14EEDEC94D7B}"/>
-              </a:ext>
-            </a:extLst>
-          </p:cNvPr>
-          <p:cNvSpPr txBox="1"/>
-          <p:nvPr/>
-        </p:nvSpPr>
-        <p:spPr>
-          <a:xfrm>
             <a:off x="6895484" y="5436938"/>
             <a:ext cx="4170157" cy="646331"/>
           </a:xfrm>
@@ -6240,7 +3649,7 @@
 </p:sld>
 </file>
 
-<file path=ppt/slides/slide8.xml><?xml version="1.0" encoding="utf-8"?>
+<file path=ppt/slides/slide4.xml><?xml version="1.0" encoding="utf-8"?>
 <p:sld xmlns:a="http://schemas.openxmlformats.org/drawingml/2006/main" xmlns:r="http://schemas.openxmlformats.org/officeDocument/2006/relationships" xmlns:p="http://schemas.openxmlformats.org/presentationml/2006/main">
   <p:cSld>
     <p:spTree>

</xml_diff>